<commit_message>
updated the presentation switched icons and arrows to be more clear.
</commit_message>
<xml_diff>
--- a/content/IoT-PoC.pptx
+++ b/content/IoT-PoC.pptx
@@ -313,7 +313,7 @@
           <a:p>
             <a:fld id="{0BBA31D7-94AE-1E41-A921-E9DF4E3D8A50}" type="datetimeFigureOut">
               <a:rPr lang="en-SE" smtClean="0"/>
-              <a:t>2024-10-15</a:t>
+              <a:t>2024-10-21</a:t>
             </a:fld>
             <a:endParaRPr lang="en-SE"/>
           </a:p>
@@ -513,7 +513,7 @@
           <a:p>
             <a:fld id="{0BBA31D7-94AE-1E41-A921-E9DF4E3D8A50}" type="datetimeFigureOut">
               <a:rPr lang="en-SE" smtClean="0"/>
-              <a:t>2024-10-15</a:t>
+              <a:t>2024-10-21</a:t>
             </a:fld>
             <a:endParaRPr lang="en-SE"/>
           </a:p>
@@ -723,7 +723,7 @@
           <a:p>
             <a:fld id="{0BBA31D7-94AE-1E41-A921-E9DF4E3D8A50}" type="datetimeFigureOut">
               <a:rPr lang="en-SE" smtClean="0"/>
-              <a:t>2024-10-15</a:t>
+              <a:t>2024-10-21</a:t>
             </a:fld>
             <a:endParaRPr lang="en-SE"/>
           </a:p>
@@ -923,7 +923,7 @@
           <a:p>
             <a:fld id="{0BBA31D7-94AE-1E41-A921-E9DF4E3D8A50}" type="datetimeFigureOut">
               <a:rPr lang="en-SE" smtClean="0"/>
-              <a:t>2024-10-15</a:t>
+              <a:t>2024-10-21</a:t>
             </a:fld>
             <a:endParaRPr lang="en-SE"/>
           </a:p>
@@ -1199,7 +1199,7 @@
           <a:p>
             <a:fld id="{0BBA31D7-94AE-1E41-A921-E9DF4E3D8A50}" type="datetimeFigureOut">
               <a:rPr lang="en-SE" smtClean="0"/>
-              <a:t>2024-10-15</a:t>
+              <a:t>2024-10-21</a:t>
             </a:fld>
             <a:endParaRPr lang="en-SE"/>
           </a:p>
@@ -1467,7 +1467,7 @@
           <a:p>
             <a:fld id="{0BBA31D7-94AE-1E41-A921-E9DF4E3D8A50}" type="datetimeFigureOut">
               <a:rPr lang="en-SE" smtClean="0"/>
-              <a:t>2024-10-15</a:t>
+              <a:t>2024-10-21</a:t>
             </a:fld>
             <a:endParaRPr lang="en-SE"/>
           </a:p>
@@ -1882,7 +1882,7 @@
           <a:p>
             <a:fld id="{0BBA31D7-94AE-1E41-A921-E9DF4E3D8A50}" type="datetimeFigureOut">
               <a:rPr lang="en-SE" smtClean="0"/>
-              <a:t>2024-10-15</a:t>
+              <a:t>2024-10-21</a:t>
             </a:fld>
             <a:endParaRPr lang="en-SE"/>
           </a:p>
@@ -2024,7 +2024,7 @@
           <a:p>
             <a:fld id="{0BBA31D7-94AE-1E41-A921-E9DF4E3D8A50}" type="datetimeFigureOut">
               <a:rPr lang="en-SE" smtClean="0"/>
-              <a:t>2024-10-15</a:t>
+              <a:t>2024-10-21</a:t>
             </a:fld>
             <a:endParaRPr lang="en-SE"/>
           </a:p>
@@ -2137,7 +2137,7 @@
           <a:p>
             <a:fld id="{0BBA31D7-94AE-1E41-A921-E9DF4E3D8A50}" type="datetimeFigureOut">
               <a:rPr lang="en-SE" smtClean="0"/>
-              <a:t>2024-10-15</a:t>
+              <a:t>2024-10-21</a:t>
             </a:fld>
             <a:endParaRPr lang="en-SE"/>
           </a:p>
@@ -2450,7 +2450,7 @@
           <a:p>
             <a:fld id="{0BBA31D7-94AE-1E41-A921-E9DF4E3D8A50}" type="datetimeFigureOut">
               <a:rPr lang="en-SE" smtClean="0"/>
-              <a:t>2024-10-15</a:t>
+              <a:t>2024-10-21</a:t>
             </a:fld>
             <a:endParaRPr lang="en-SE"/>
           </a:p>
@@ -2739,7 +2739,7 @@
           <a:p>
             <a:fld id="{0BBA31D7-94AE-1E41-A921-E9DF4E3D8A50}" type="datetimeFigureOut">
               <a:rPr lang="en-SE" smtClean="0"/>
-              <a:t>2024-10-15</a:t>
+              <a:t>2024-10-21</a:t>
             </a:fld>
             <a:endParaRPr lang="en-SE"/>
           </a:p>
@@ -2982,7 +2982,7 @@
           <a:p>
             <a:fld id="{0BBA31D7-94AE-1E41-A921-E9DF4E3D8A50}" type="datetimeFigureOut">
               <a:rPr lang="en-SE" smtClean="0"/>
-              <a:t>2024-10-15</a:t>
+              <a:t>2024-10-21</a:t>
             </a:fld>
             <a:endParaRPr lang="en-SE"/>
           </a:p>
@@ -3505,8 +3505,8 @@
           </a:extLst>
         </p:spPr>
       </p:pic>
-      <mc:AlternateContent xmlns:mc="http://schemas.openxmlformats.org/markup-compatibility/2006">
-        <mc:Choice xmlns:psez="http://schemas.microsoft.com/office/powerpoint/2016/sectionzoom" Requires="psez">
+      <mc:AlternateContent xmlns:mc="http://schemas.openxmlformats.org/markup-compatibility/2006" xmlns:psez="http://schemas.microsoft.com/office/powerpoint/2016/sectionzoom">
+        <mc:Choice Requires="psez">
           <p:graphicFrame>
             <p:nvGraphicFramePr>
               <p:cNvPr id="7" name="Section Zoom 6">
@@ -3558,7 +3558,7 @@
             </a:graphic>
           </p:graphicFrame>
         </mc:Choice>
-        <mc:Fallback>
+        <mc:Fallback xmlns="">
           <p:pic>
             <p:nvPicPr>
               <p:cNvPr id="7" name="Section Zoom 6">
@@ -3575,7 +3575,7 @@
               <p:nvPr/>
             </p:nvPicPr>
             <p:blipFill>
-              <a:blip r:embed="rId4"/>
+              <a:blip r:embed="rId6"/>
               <a:stretch>
                 <a:fillRect/>
               </a:stretch>
@@ -3609,13 +3609,13 @@
               <p:nvPr>
                 <p:extLst>
                   <p:ext uri="{D42A27DB-BD31-4B8C-83A1-F6EECF244321}">
-                    <p14:modId xmlns:p14="http://schemas.microsoft.com/office/powerpoint/2010/main" val="3828257612"/>
+                    <p14:modId xmlns:p14="http://schemas.microsoft.com/office/powerpoint/2010/main" val="2404803377"/>
                   </p:ext>
                 </p:extLst>
               </p:nvPr>
             </p:nvGraphicFramePr>
             <p:xfrm>
-              <a:off x="2598984" y="1820545"/>
+              <a:off x="2586415" y="1785621"/>
               <a:ext cx="5029200" cy="2828925"/>
             </p:xfrm>
             <a:graphic>
@@ -3624,7 +3624,7 @@
                   <psez:sectionZmObj sectionId="{0005D7C9-3648-B84D-BF1C-BC71FC58D9F1}">
                     <psez:zmPr id="{EAA640DF-B249-9D4A-887E-C920FAD4F89B}" transitionDur="1000" showBg="0">
                       <p166:blipFill xmlns:p166="http://schemas.microsoft.com/office/powerpoint/2016/6/main">
-                        <a:blip r:embed="rId6"/>
+                        <a:blip r:embed="rId7"/>
                         <a:stretch>
                           <a:fillRect/>
                         </a:stretch>
@@ -3649,7 +3649,7 @@
           <p:pic>
             <p:nvPicPr>
               <p:cNvPr id="9" name="Section Zoom 8">
-                <a:hlinkClick r:id="rId7" action="ppaction://hlinksldjump"/>
+                <a:hlinkClick r:id="rId8" action="ppaction://hlinksldjump"/>
                 <a:extLst>
                   <a:ext uri="{FF2B5EF4-FFF2-40B4-BE49-F238E27FC236}">
                     <a16:creationId xmlns:a16="http://schemas.microsoft.com/office/drawing/2014/main" id="{AEBF6B72-D5D3-F218-63FF-F703E2240EEB}"/>
@@ -3662,14 +3662,14 @@
               <p:nvPr/>
             </p:nvPicPr>
             <p:blipFill>
-              <a:blip r:embed="rId6"/>
+              <a:blip r:embed="rId7"/>
               <a:stretch>
                 <a:fillRect/>
               </a:stretch>
             </p:blipFill>
             <p:spPr>
               <a:xfrm>
-                <a:off x="2598984" y="1820545"/>
+                <a:off x="2586415" y="1785621"/>
                 <a:ext cx="5029200" cy="2828925"/>
               </a:xfrm>
               <a:prstGeom prst="rect">
@@ -3679,8 +3679,8 @@
           </p:pic>
         </mc:Fallback>
       </mc:AlternateContent>
-      <mc:AlternateContent xmlns:mc="http://schemas.openxmlformats.org/markup-compatibility/2006">
-        <mc:Choice xmlns:psez="http://schemas.microsoft.com/office/powerpoint/2016/sectionzoom" Requires="psez">
+      <mc:AlternateContent xmlns:mc="http://schemas.openxmlformats.org/markup-compatibility/2006" xmlns:psez="http://schemas.microsoft.com/office/powerpoint/2016/sectionzoom">
+        <mc:Choice Requires="psez">
           <p:graphicFrame>
             <p:nvGraphicFramePr>
               <p:cNvPr id="11" name="Section Zoom 10">
@@ -3711,7 +3711,7 @@
                   <psez:sectionZmObj sectionId="{2E6CA29B-1E04-BA44-81CA-D93B4B01BC32}">
                     <psez:zmPr id="{AB223ABD-8EEB-E546-BEC6-3AB61A7EDF46}" transitionDur="1000" showBg="0">
                       <p166:blipFill xmlns:p166="http://schemas.microsoft.com/office/powerpoint/2016/6/main">
-                        <a:blip r:embed="rId8"/>
+                        <a:blip r:embed="rId9"/>
                         <a:stretch>
                           <a:fillRect/>
                         </a:stretch>
@@ -3732,11 +3732,11 @@
             </a:graphic>
           </p:graphicFrame>
         </mc:Choice>
-        <mc:Fallback>
+        <mc:Fallback xmlns="">
           <p:pic>
             <p:nvPicPr>
               <p:cNvPr id="11" name="Section Zoom 10">
-                <a:hlinkClick r:id="rId9" action="ppaction://hlinksldjump"/>
+                <a:hlinkClick r:id="rId10" action="ppaction://hlinksldjump"/>
                 <a:extLst>
                   <a:ext uri="{FF2B5EF4-FFF2-40B4-BE49-F238E27FC236}">
                     <a16:creationId xmlns:a16="http://schemas.microsoft.com/office/drawing/2014/main" id="{927C95C1-D23D-A373-7EFD-30AD3EE06126}"/>
@@ -3749,7 +3749,7 @@
               <p:nvPr/>
             </p:nvPicPr>
             <p:blipFill>
-              <a:blip r:embed="rId8"/>
+              <a:blip r:embed="rId11"/>
               <a:stretch>
                 <a:fillRect/>
               </a:stretch>
@@ -3766,8 +3766,8 @@
           </p:pic>
         </mc:Fallback>
       </mc:AlternateContent>
-      <mc:AlternateContent xmlns:mc="http://schemas.openxmlformats.org/markup-compatibility/2006">
-        <mc:Choice xmlns:psez="http://schemas.microsoft.com/office/powerpoint/2016/sectionzoom" Requires="psez">
+      <mc:AlternateContent xmlns:mc="http://schemas.openxmlformats.org/markup-compatibility/2006" xmlns:psez="http://schemas.microsoft.com/office/powerpoint/2016/sectionzoom">
+        <mc:Choice Requires="psez">
           <p:graphicFrame>
             <p:nvGraphicFramePr>
               <p:cNvPr id="13" name="Section Zoom 12">
@@ -3798,7 +3798,7 @@
                   <psez:sectionZmObj sectionId="{46B29C5F-FED7-5F4D-9793-7D58EDFE9D86}">
                     <psez:zmPr id="{0ADCD9FE-9E6D-6644-9F30-E69CFDD1897F}" transitionDur="1000" showBg="0">
                       <p166:blipFill xmlns:p166="http://schemas.microsoft.com/office/powerpoint/2016/6/main">
-                        <a:blip r:embed="rId10"/>
+                        <a:blip r:embed="rId12"/>
                         <a:stretch>
                           <a:fillRect/>
                         </a:stretch>
@@ -3819,11 +3819,11 @@
             </a:graphic>
           </p:graphicFrame>
         </mc:Choice>
-        <mc:Fallback>
+        <mc:Fallback xmlns="">
           <p:pic>
             <p:nvPicPr>
               <p:cNvPr id="13" name="Section Zoom 12">
-                <a:hlinkClick r:id="rId11" action="ppaction://hlinksldjump"/>
+                <a:hlinkClick r:id="rId13" action="ppaction://hlinksldjump"/>
                 <a:extLst>
                   <a:ext uri="{FF2B5EF4-FFF2-40B4-BE49-F238E27FC236}">
                     <a16:creationId xmlns:a16="http://schemas.microsoft.com/office/drawing/2014/main" id="{D6659529-44CE-5A46-A933-4794CC4A5843}"/>
@@ -3836,7 +3836,7 @@
               <p:nvPr/>
             </p:nvPicPr>
             <p:blipFill>
-              <a:blip r:embed="rId10"/>
+              <a:blip r:embed="rId14"/>
               <a:stretch>
                 <a:fillRect/>
               </a:stretch>
@@ -3853,6 +3853,150 @@
           </p:pic>
         </mc:Fallback>
       </mc:AlternateContent>
+      <p:pic>
+        <p:nvPicPr>
+          <p:cNvPr id="5" name="Graphic 4" descr="Badge 1 with solid fill">
+            <a:extLst>
+              <a:ext uri="{FF2B5EF4-FFF2-40B4-BE49-F238E27FC236}">
+                <a16:creationId xmlns:a16="http://schemas.microsoft.com/office/drawing/2014/main" id="{3E249DBC-2CDA-6600-04C3-F67A40FB84D4}"/>
+              </a:ext>
+            </a:extLst>
+          </p:cNvPr>
+          <p:cNvPicPr>
+            <a:picLocks noChangeAspect="1"/>
+          </p:cNvPicPr>
+          <p:nvPr/>
+        </p:nvPicPr>
+        <p:blipFill>
+          <a:blip r:embed="rId15">
+            <a:extLst>
+              <a:ext uri="{96DAC541-7B7A-43D3-8B79-37D633B846F1}">
+                <asvg:svgBlip xmlns:asvg="http://schemas.microsoft.com/office/drawing/2016/SVG/main" r:embed="rId16"/>
+              </a:ext>
+            </a:extLst>
+          </a:blip>
+          <a:stretch>
+            <a:fillRect/>
+          </a:stretch>
+        </p:blipFill>
+        <p:spPr>
+          <a:xfrm>
+            <a:off x="686285" y="5278437"/>
+            <a:ext cx="914400" cy="914400"/>
+          </a:xfrm>
+          <a:prstGeom prst="rect">
+            <a:avLst/>
+          </a:prstGeom>
+        </p:spPr>
+      </p:pic>
+      <p:pic>
+        <p:nvPicPr>
+          <p:cNvPr id="12" name="Graphic 11" descr="Badge with solid fill">
+            <a:extLst>
+              <a:ext uri="{FF2B5EF4-FFF2-40B4-BE49-F238E27FC236}">
+                <a16:creationId xmlns:a16="http://schemas.microsoft.com/office/drawing/2014/main" id="{23B8D59D-C88C-7B8E-A7D2-4B79F5F357B6}"/>
+              </a:ext>
+            </a:extLst>
+          </p:cNvPr>
+          <p:cNvPicPr>
+            <a:picLocks noChangeAspect="1"/>
+          </p:cNvPicPr>
+          <p:nvPr/>
+        </p:nvPicPr>
+        <p:blipFill>
+          <a:blip r:embed="rId17">
+            <a:extLst>
+              <a:ext uri="{96DAC541-7B7A-43D3-8B79-37D633B846F1}">
+                <asvg:svgBlip xmlns:asvg="http://schemas.microsoft.com/office/drawing/2016/SVG/main" r:embed="rId18"/>
+              </a:ext>
+            </a:extLst>
+          </a:blip>
+          <a:stretch>
+            <a:fillRect/>
+          </a:stretch>
+        </p:blipFill>
+        <p:spPr>
+          <a:xfrm>
+            <a:off x="4013764" y="4067177"/>
+            <a:ext cx="914400" cy="914400"/>
+          </a:xfrm>
+          <a:prstGeom prst="rect">
+            <a:avLst/>
+          </a:prstGeom>
+        </p:spPr>
+      </p:pic>
+      <p:pic>
+        <p:nvPicPr>
+          <p:cNvPr id="15" name="Graphic 14" descr="Badge 3 with solid fill">
+            <a:extLst>
+              <a:ext uri="{FF2B5EF4-FFF2-40B4-BE49-F238E27FC236}">
+                <a16:creationId xmlns:a16="http://schemas.microsoft.com/office/drawing/2014/main" id="{168161FB-62AF-576F-E668-041595DC4D1C}"/>
+              </a:ext>
+            </a:extLst>
+          </p:cNvPr>
+          <p:cNvPicPr>
+            <a:picLocks noChangeAspect="1"/>
+          </p:cNvPicPr>
+          <p:nvPr/>
+        </p:nvPicPr>
+        <p:blipFill>
+          <a:blip r:embed="rId19">
+            <a:extLst>
+              <a:ext uri="{96DAC541-7B7A-43D3-8B79-37D633B846F1}">
+                <asvg:svgBlip xmlns:asvg="http://schemas.microsoft.com/office/drawing/2016/SVG/main" r:embed="rId20"/>
+              </a:ext>
+            </a:extLst>
+          </a:blip>
+          <a:stretch>
+            <a:fillRect/>
+          </a:stretch>
+        </p:blipFill>
+        <p:spPr>
+          <a:xfrm>
+            <a:off x="7434041" y="2350893"/>
+            <a:ext cx="914400" cy="914400"/>
+          </a:xfrm>
+          <a:prstGeom prst="rect">
+            <a:avLst/>
+          </a:prstGeom>
+        </p:spPr>
+      </p:pic>
+      <p:pic>
+        <p:nvPicPr>
+          <p:cNvPr id="17" name="Graphic 16" descr="Badge 4 with solid fill">
+            <a:extLst>
+              <a:ext uri="{FF2B5EF4-FFF2-40B4-BE49-F238E27FC236}">
+                <a16:creationId xmlns:a16="http://schemas.microsoft.com/office/drawing/2014/main" id="{B4C8721C-E66F-F9EA-26E2-147B28C72081}"/>
+              </a:ext>
+            </a:extLst>
+          </p:cNvPr>
+          <p:cNvPicPr>
+            <a:picLocks noChangeAspect="1"/>
+          </p:cNvPicPr>
+          <p:nvPr/>
+        </p:nvPicPr>
+        <p:blipFill>
+          <a:blip r:embed="rId21">
+            <a:extLst>
+              <a:ext uri="{96DAC541-7B7A-43D3-8B79-37D633B846F1}">
+                <asvg:svgBlip xmlns:asvg="http://schemas.microsoft.com/office/drawing/2016/SVG/main" r:embed="rId22"/>
+              </a:ext>
+            </a:extLst>
+          </a:blip>
+          <a:stretch>
+            <a:fillRect/>
+          </a:stretch>
+        </p:blipFill>
+        <p:spPr>
+          <a:xfrm>
+            <a:off x="10060202" y="3901818"/>
+            <a:ext cx="914400" cy="914400"/>
+          </a:xfrm>
+          <a:prstGeom prst="rect">
+            <a:avLst/>
+          </a:prstGeom>
+        </p:spPr>
+      </p:pic>
     </p:spTree>
     <p:extLst>
       <p:ext uri="{BB962C8B-B14F-4D97-AF65-F5344CB8AC3E}">
@@ -4071,11 +4215,11 @@
   <p:clrMapOvr>
     <a:masterClrMapping/>
   </p:clrMapOvr>
-  <mc:AlternateContent xmlns:mc="http://schemas.openxmlformats.org/markup-compatibility/2006">
-    <mc:Choice xmlns:p14="http://schemas.microsoft.com/office/powerpoint/2010/main" Requires="p14">
+  <mc:AlternateContent xmlns:mc="http://schemas.openxmlformats.org/markup-compatibility/2006" xmlns:p14="http://schemas.microsoft.com/office/powerpoint/2010/main">
+    <mc:Choice Requires="p14">
       <p:transition p14:dur="10"/>
     </mc:Choice>
-    <mc:Fallback>
+    <mc:Fallback xmlns="">
       <p:transition/>
     </mc:Fallback>
   </mc:AlternateContent>
@@ -4188,51 +4332,6 @@
           </a:p>
         </p:txBody>
       </p:sp>
-      <p:cxnSp>
-        <p:nvCxnSpPr>
-          <p:cNvPr id="16" name="Straight Arrow Connector 15">
-            <a:extLst>
-              <a:ext uri="{FF2B5EF4-FFF2-40B4-BE49-F238E27FC236}">
-                <a16:creationId xmlns:a16="http://schemas.microsoft.com/office/drawing/2014/main" id="{A9898B9E-CCE7-1A09-6EAC-F84A32C665EC}"/>
-              </a:ext>
-            </a:extLst>
-          </p:cNvPr>
-          <p:cNvCxnSpPr/>
-          <p:nvPr/>
-        </p:nvCxnSpPr>
-        <p:spPr>
-          <a:xfrm>
-            <a:off x="3513299" y="1895798"/>
-            <a:ext cx="914400" cy="914400"/>
-          </a:xfrm>
-          <a:prstGeom prst="straightConnector1">
-            <a:avLst/>
-          </a:prstGeom>
-          <a:ln w="19050" cap="flat" cmpd="sng" algn="ctr">
-            <a:solidFill>
-              <a:schemeClr val="accent2"/>
-            </a:solidFill>
-            <a:prstDash val="solid"/>
-            <a:round/>
-            <a:headEnd type="arrow" w="med" len="med"/>
-            <a:tailEnd type="arrow" w="med" len="med"/>
-          </a:ln>
-        </p:spPr>
-        <p:style>
-          <a:lnRef idx="0">
-            <a:scrgbClr r="0" g="0" b="0"/>
-          </a:lnRef>
-          <a:fillRef idx="0">
-            <a:scrgbClr r="0" g="0" b="0"/>
-          </a:fillRef>
-          <a:effectRef idx="0">
-            <a:scrgbClr r="0" g="0" b="0"/>
-          </a:effectRef>
-          <a:fontRef idx="minor">
-            <a:schemeClr val="tx1"/>
-          </a:fontRef>
-        </p:style>
-      </p:cxnSp>
       <p:pic>
         <p:nvPicPr>
           <p:cNvPr id="18" name="Graphic 17" descr="High temperature with solid fill">
@@ -4310,12 +4409,53 @@
           </a:p>
         </p:txBody>
       </p:sp>
+      <p:sp>
+        <p:nvSpPr>
+          <p:cNvPr id="23" name="TextBox 22">
+            <a:extLst>
+              <a:ext uri="{FF2B5EF4-FFF2-40B4-BE49-F238E27FC236}">
+                <a16:creationId xmlns:a16="http://schemas.microsoft.com/office/drawing/2014/main" id="{655E1052-51F3-A1A0-4367-FEAA93070381}"/>
+              </a:ext>
+            </a:extLst>
+          </p:cNvPr>
+          <p:cNvSpPr txBox="1"/>
+          <p:nvPr/>
+        </p:nvSpPr>
+        <p:spPr>
+          <a:xfrm>
+            <a:off x="8435352" y="1186965"/>
+            <a:ext cx="875561" cy="461665"/>
+          </a:xfrm>
+          <a:prstGeom prst="rect">
+            <a:avLst/>
+          </a:prstGeom>
+          <a:noFill/>
+        </p:spPr>
+        <p:txBody>
+          <a:bodyPr wrap="none" rtlCol="0">
+            <a:spAutoFit/>
+          </a:bodyPr>
+          <a:lstStyle/>
+          <a:p>
+            <a:r>
+              <a:rPr lang="en-SE" sz="2400" dirty="0">
+                <a:solidFill>
+                  <a:schemeClr val="accent2">
+                    <a:lumMod val="75000"/>
+                  </a:schemeClr>
+                </a:solidFill>
+              </a:rPr>
+              <a:t>HTTP</a:t>
+            </a:r>
+          </a:p>
+        </p:txBody>
+      </p:sp>
       <p:cxnSp>
         <p:nvCxnSpPr>
-          <p:cNvPr id="21" name="Curved Connector 20">
-            <a:extLst>
-              <a:ext uri="{FF2B5EF4-FFF2-40B4-BE49-F238E27FC236}">
-                <a16:creationId xmlns:a16="http://schemas.microsoft.com/office/drawing/2014/main" id="{A2CC5E03-8DC1-5503-C07E-1F1ED4DF667C}"/>
+          <p:cNvPr id="3" name="Curved Connector 2">
+            <a:extLst>
+              <a:ext uri="{FF2B5EF4-FFF2-40B4-BE49-F238E27FC236}">
+                <a16:creationId xmlns:a16="http://schemas.microsoft.com/office/drawing/2014/main" id="{2CE2ED6C-100F-DD08-D568-FFFFDDA64453}"/>
               </a:ext>
             </a:extLst>
           </p:cNvPr>
@@ -4326,8 +4466,8 @@
         </p:nvCxnSpPr>
         <p:spPr>
           <a:xfrm flipV="1">
-            <a:off x="7764301" y="317500"/>
-            <a:ext cx="3221199" cy="2730500"/>
+            <a:off x="7764301" y="428367"/>
+            <a:ext cx="3143078" cy="2718487"/>
           </a:xfrm>
           <a:prstGeom prst="curvedConnector3">
             <a:avLst>
@@ -4335,7 +4475,6 @@
             </a:avLst>
           </a:prstGeom>
           <a:ln>
-            <a:headEnd type="triangle"/>
             <a:tailEnd type="triangle"/>
           </a:ln>
         </p:spPr>
@@ -4354,47 +4493,45 @@
           </a:fontRef>
         </p:style>
       </p:cxnSp>
-      <p:sp>
-        <p:nvSpPr>
-          <p:cNvPr id="23" name="TextBox 22">
-            <a:extLst>
-              <a:ext uri="{FF2B5EF4-FFF2-40B4-BE49-F238E27FC236}">
-                <a16:creationId xmlns:a16="http://schemas.microsoft.com/office/drawing/2014/main" id="{655E1052-51F3-A1A0-4367-FEAA93070381}"/>
-              </a:ext>
-            </a:extLst>
-          </p:cNvPr>
-          <p:cNvSpPr txBox="1"/>
+      <p:cxnSp>
+        <p:nvCxnSpPr>
+          <p:cNvPr id="11" name="Straight Arrow Connector 10">
+            <a:extLst>
+              <a:ext uri="{FF2B5EF4-FFF2-40B4-BE49-F238E27FC236}">
+                <a16:creationId xmlns:a16="http://schemas.microsoft.com/office/drawing/2014/main" id="{07454D34-2296-02F8-0177-52FB7E45BE22}"/>
+              </a:ext>
+            </a:extLst>
+          </p:cNvPr>
+          <p:cNvCxnSpPr/>
           <p:nvPr/>
-        </p:nvSpPr>
+        </p:nvCxnSpPr>
         <p:spPr>
           <a:xfrm>
-            <a:off x="8435352" y="1186965"/>
-            <a:ext cx="875561" cy="461665"/>
+            <a:off x="3513299" y="1874999"/>
+            <a:ext cx="914400" cy="914400"/>
           </a:xfrm>
-          <a:prstGeom prst="rect">
+          <a:prstGeom prst="straightConnector1">
             <a:avLst/>
           </a:prstGeom>
-          <a:noFill/>
+          <a:ln>
+            <a:tailEnd type="triangle"/>
+          </a:ln>
         </p:spPr>
-        <p:txBody>
-          <a:bodyPr wrap="none" rtlCol="0">
-            <a:spAutoFit/>
-          </a:bodyPr>
-          <a:lstStyle/>
-          <a:p>
-            <a:r>
-              <a:rPr lang="en-SE" sz="2400" dirty="0">
-                <a:solidFill>
-                  <a:schemeClr val="accent2">
-                    <a:lumMod val="75000"/>
-                  </a:schemeClr>
-                </a:solidFill>
-              </a:rPr>
-              <a:t>HTTP</a:t>
-            </a:r>
-          </a:p>
-        </p:txBody>
-      </p:sp>
+        <p:style>
+          <a:lnRef idx="2">
+            <a:schemeClr val="accent2"/>
+          </a:lnRef>
+          <a:fillRef idx="0">
+            <a:schemeClr val="accent2"/>
+          </a:fillRef>
+          <a:effectRef idx="1">
+            <a:schemeClr val="accent2"/>
+          </a:effectRef>
+          <a:fontRef idx="minor">
+            <a:schemeClr val="tx1"/>
+          </a:fontRef>
+        </p:style>
+      </p:cxnSp>
     </p:spTree>
     <p:extLst>
       <p:ext uri="{BB962C8B-B14F-4D97-AF65-F5344CB8AC3E}">
@@ -4405,13 +4542,13 @@
   <p:clrMapOvr>
     <a:masterClrMapping/>
   </p:clrMapOvr>
-  <mc:AlternateContent xmlns:mc="http://schemas.openxmlformats.org/markup-compatibility/2006">
-    <mc:Choice xmlns:p159="http://schemas.microsoft.com/office/powerpoint/2015/09/main" Requires="p159">
+  <mc:AlternateContent xmlns:mc="http://schemas.openxmlformats.org/markup-compatibility/2006" xmlns:p159="http://schemas.microsoft.com/office/powerpoint/2015/09/main">
+    <mc:Choice Requires="p159">
       <p:transition xmlns:p14="http://schemas.microsoft.com/office/powerpoint/2010/main" spd="slow" p14:dur="2000">
         <p159:morph option="byObject"/>
       </p:transition>
     </mc:Choice>
-    <mc:Fallback>
+    <mc:Fallback xmlns="">
       <p:transition spd="slow">
         <p:fade/>
       </p:transition>
@@ -4598,11 +4735,11 @@
   <p:clrMapOvr>
     <a:masterClrMapping/>
   </p:clrMapOvr>
-  <mc:AlternateContent xmlns:mc="http://schemas.openxmlformats.org/markup-compatibility/2006">
-    <mc:Choice xmlns:p14="http://schemas.microsoft.com/office/powerpoint/2010/main" Requires="p14">
+  <mc:AlternateContent xmlns:mc="http://schemas.openxmlformats.org/markup-compatibility/2006" xmlns:p14="http://schemas.microsoft.com/office/powerpoint/2010/main">
+    <mc:Choice Requires="p14">
       <p:transition p14:dur="10"/>
     </mc:Choice>
-    <mc:Fallback>
+    <mc:Fallback xmlns="">
       <p:transition/>
     </mc:Fallback>
   </mc:AlternateContent>
@@ -4740,53 +4877,6 @@
           </a:p>
         </p:txBody>
       </p:sp>
-      <p:cxnSp>
-        <p:nvCxnSpPr>
-          <p:cNvPr id="16" name="Straight Arrow Connector 15">
-            <a:extLst>
-              <a:ext uri="{FF2B5EF4-FFF2-40B4-BE49-F238E27FC236}">
-                <a16:creationId xmlns:a16="http://schemas.microsoft.com/office/drawing/2014/main" id="{E955E4E2-071A-1A90-2234-B44C288FB9FF}"/>
-              </a:ext>
-            </a:extLst>
-          </p:cNvPr>
-          <p:cNvCxnSpPr>
-            <a:cxnSpLocks/>
-          </p:cNvCxnSpPr>
-          <p:nvPr/>
-        </p:nvCxnSpPr>
-        <p:spPr>
-          <a:xfrm flipV="1">
-            <a:off x="685800" y="4059399"/>
-            <a:ext cx="3538699" cy="1668301"/>
-          </a:xfrm>
-          <a:prstGeom prst="straightConnector1">
-            <a:avLst/>
-          </a:prstGeom>
-          <a:ln w="19050" cap="flat" cmpd="sng" algn="ctr">
-            <a:solidFill>
-              <a:schemeClr val="accent2"/>
-            </a:solidFill>
-            <a:prstDash val="solid"/>
-            <a:round/>
-            <a:headEnd type="arrow" w="med" len="med"/>
-            <a:tailEnd type="arrow" w="med" len="med"/>
-          </a:ln>
-        </p:spPr>
-        <p:style>
-          <a:lnRef idx="0">
-            <a:scrgbClr r="0" g="0" b="0"/>
-          </a:lnRef>
-          <a:fillRef idx="0">
-            <a:scrgbClr r="0" g="0" b="0"/>
-          </a:fillRef>
-          <a:effectRef idx="0">
-            <a:scrgbClr r="0" g="0" b="0"/>
-          </a:effectRef>
-          <a:fontRef idx="minor">
-            <a:schemeClr val="tx1"/>
-          </a:fontRef>
-        </p:style>
-      </p:cxnSp>
       <p:sp>
         <p:nvSpPr>
           <p:cNvPr id="19" name="TextBox 18">
@@ -4862,12 +4952,87 @@
           </a:p>
         </p:txBody>
       </p:sp>
+      <p:sp>
+        <p:nvSpPr>
+          <p:cNvPr id="23" name="TextBox 22">
+            <a:extLst>
+              <a:ext uri="{FF2B5EF4-FFF2-40B4-BE49-F238E27FC236}">
+                <a16:creationId xmlns:a16="http://schemas.microsoft.com/office/drawing/2014/main" id="{C794B663-09EF-1557-1EDA-B9BDA0CE69A0}"/>
+              </a:ext>
+            </a:extLst>
+          </p:cNvPr>
+          <p:cNvSpPr txBox="1"/>
+          <p:nvPr/>
+        </p:nvSpPr>
+        <p:spPr>
+          <a:xfrm>
+            <a:off x="8067052" y="1451917"/>
+            <a:ext cx="1182311" cy="461665"/>
+          </a:xfrm>
+          <a:prstGeom prst="rect">
+            <a:avLst/>
+          </a:prstGeom>
+          <a:noFill/>
+        </p:spPr>
+        <p:txBody>
+          <a:bodyPr wrap="none" rtlCol="0">
+            <a:spAutoFit/>
+          </a:bodyPr>
+          <a:lstStyle/>
+          <a:p>
+            <a:pPr marL="0" marR="0" lvl="0" indent="0" algn="l" defTabSz="914400" rtl="0" eaLnBrk="1" fontAlgn="auto" latinLnBrk="0" hangingPunct="1">
+              <a:lnSpc>
+                <a:spcPct val="100000"/>
+              </a:lnSpc>
+              <a:spcBef>
+                <a:spcPts val="0"/>
+              </a:spcBef>
+              <a:spcAft>
+                <a:spcPts val="0"/>
+              </a:spcAft>
+              <a:buClrTx/>
+              <a:buSzTx/>
+              <a:buFontTx/>
+              <a:buNone/>
+              <a:tabLst/>
+              <a:defRPr/>
+            </a:pPr>
+            <a:r>
+              <a:rPr lang="en-SE" sz="2400" dirty="0">
+                <a:solidFill>
+                  <a:srgbClr val="E97132">
+                    <a:lumMod val="75000"/>
+                  </a:srgbClr>
+                </a:solidFill>
+                <a:latin typeface="Aptos" panose="02110004020202020204"/>
+              </a:rPr>
+              <a:t>Netbird</a:t>
+            </a:r>
+            <a:endParaRPr kumimoji="0" lang="en-SE" sz="2400" b="0" i="0" u="none" strike="noStrike" kern="1200" cap="none" spc="0" normalizeH="0" baseline="0" noProof="0" dirty="0">
+              <a:ln>
+                <a:noFill/>
+              </a:ln>
+              <a:solidFill>
+                <a:srgbClr val="E97132">
+                  <a:lumMod val="75000"/>
+                </a:srgbClr>
+              </a:solidFill>
+              <a:effectLst/>
+              <a:uLnTx/>
+              <a:uFillTx/>
+              <a:latin typeface="Aptos" panose="02110004020202020204"/>
+              <a:ea typeface="+mn-ea"/>
+              <a:cs typeface="+mn-cs"/>
+            </a:endParaRPr>
+          </a:p>
+        </p:txBody>
+      </p:sp>
       <p:cxnSp>
         <p:nvCxnSpPr>
-          <p:cNvPr id="21" name="Curved Connector 20">
-            <a:extLst>
-              <a:ext uri="{FF2B5EF4-FFF2-40B4-BE49-F238E27FC236}">
-                <a16:creationId xmlns:a16="http://schemas.microsoft.com/office/drawing/2014/main" id="{EE177F72-6B6A-B6F7-2083-F0BF5E86D519}"/>
+          <p:cNvPr id="3" name="Straight Arrow Connector 2">
+            <a:extLst>
+              <a:ext uri="{FF2B5EF4-FFF2-40B4-BE49-F238E27FC236}">
+                <a16:creationId xmlns:a16="http://schemas.microsoft.com/office/drawing/2014/main" id="{26CCCBE5-3BD2-A82B-EFC6-0F02FD1642D4}"/>
               </a:ext>
             </a:extLst>
           </p:cNvPr>
@@ -4878,16 +5043,13 @@
         </p:nvCxnSpPr>
         <p:spPr>
           <a:xfrm flipV="1">
-            <a:off x="7764301" y="317500"/>
-            <a:ext cx="3221199" cy="2730500"/>
+            <a:off x="815545" y="4159217"/>
+            <a:ext cx="3376002" cy="1647567"/>
           </a:xfrm>
-          <a:prstGeom prst="curvedConnector3">
-            <a:avLst>
-              <a:gd name="adj1" fmla="val 50000"/>
-            </a:avLst>
+          <a:prstGeom prst="straightConnector1">
+            <a:avLst/>
           </a:prstGeom>
           <a:ln>
-            <a:headEnd type="triangle"/>
             <a:tailEnd type="triangle"/>
           </a:ln>
         </p:spPr>
@@ -4906,81 +5068,47 @@
           </a:fontRef>
         </p:style>
       </p:cxnSp>
-      <p:sp>
-        <p:nvSpPr>
-          <p:cNvPr id="23" name="TextBox 22">
-            <a:extLst>
-              <a:ext uri="{FF2B5EF4-FFF2-40B4-BE49-F238E27FC236}">
-                <a16:creationId xmlns:a16="http://schemas.microsoft.com/office/drawing/2014/main" id="{C794B663-09EF-1557-1EDA-B9BDA0CE69A0}"/>
-              </a:ext>
-            </a:extLst>
-          </p:cNvPr>
-          <p:cNvSpPr txBox="1"/>
+      <p:cxnSp>
+        <p:nvCxnSpPr>
+          <p:cNvPr id="8" name="Curved Connector 7">
+            <a:extLst>
+              <a:ext uri="{FF2B5EF4-FFF2-40B4-BE49-F238E27FC236}">
+                <a16:creationId xmlns:a16="http://schemas.microsoft.com/office/drawing/2014/main" id="{B52A0289-17AC-329D-8ECF-D64DB2F699D3}"/>
+              </a:ext>
+            </a:extLst>
+          </p:cNvPr>
+          <p:cNvCxnSpPr>
+            <a:cxnSpLocks/>
+          </p:cNvCxnSpPr>
           <p:nvPr/>
-        </p:nvSpPr>
+        </p:nvCxnSpPr>
         <p:spPr>
-          <a:xfrm>
-            <a:off x="8067052" y="1451917"/>
-            <a:ext cx="1182311" cy="461665"/>
+          <a:xfrm flipV="1">
+            <a:off x="7792995" y="436605"/>
+            <a:ext cx="3101889" cy="2660822"/>
           </a:xfrm>
-          <a:prstGeom prst="rect">
+          <a:prstGeom prst="curvedConnector3">
             <a:avLst/>
           </a:prstGeom>
-          <a:noFill/>
+          <a:ln>
+            <a:tailEnd type="triangle"/>
+          </a:ln>
         </p:spPr>
-        <p:txBody>
-          <a:bodyPr wrap="none" rtlCol="0">
-            <a:spAutoFit/>
-          </a:bodyPr>
-          <a:lstStyle/>
-          <a:p>
-            <a:pPr marL="0" marR="0" lvl="0" indent="0" algn="l" defTabSz="914400" rtl="0" eaLnBrk="1" fontAlgn="auto" latinLnBrk="0" hangingPunct="1">
-              <a:lnSpc>
-                <a:spcPct val="100000"/>
-              </a:lnSpc>
-              <a:spcBef>
-                <a:spcPts val="0"/>
-              </a:spcBef>
-              <a:spcAft>
-                <a:spcPts val="0"/>
-              </a:spcAft>
-              <a:buClrTx/>
-              <a:buSzTx/>
-              <a:buFontTx/>
-              <a:buNone/>
-              <a:tabLst/>
-              <a:defRPr/>
-            </a:pPr>
-            <a:r>
-              <a:rPr lang="en-SE" sz="2400" dirty="0">
-                <a:solidFill>
-                  <a:srgbClr val="E97132">
-                    <a:lumMod val="75000"/>
-                  </a:srgbClr>
-                </a:solidFill>
-                <a:latin typeface="Aptos" panose="02110004020202020204"/>
-              </a:rPr>
-              <a:t>Netbird</a:t>
-            </a:r>
-            <a:endParaRPr kumimoji="0" lang="en-SE" sz="2400" b="0" i="0" u="none" strike="noStrike" kern="1200" cap="none" spc="0" normalizeH="0" baseline="0" noProof="0" dirty="0">
-              <a:ln>
-                <a:noFill/>
-              </a:ln>
-              <a:solidFill>
-                <a:srgbClr val="E97132">
-                  <a:lumMod val="75000"/>
-                </a:srgbClr>
-              </a:solidFill>
-              <a:effectLst/>
-              <a:uLnTx/>
-              <a:uFillTx/>
-              <a:latin typeface="Aptos" panose="02110004020202020204"/>
-              <a:ea typeface="+mn-ea"/>
-              <a:cs typeface="+mn-cs"/>
-            </a:endParaRPr>
-          </a:p>
-        </p:txBody>
-      </p:sp>
+        <p:style>
+          <a:lnRef idx="2">
+            <a:schemeClr val="accent2"/>
+          </a:lnRef>
+          <a:fillRef idx="0">
+            <a:schemeClr val="accent2"/>
+          </a:fillRef>
+          <a:effectRef idx="1">
+            <a:schemeClr val="accent2"/>
+          </a:effectRef>
+          <a:fontRef idx="minor">
+            <a:schemeClr val="tx1"/>
+          </a:fontRef>
+        </p:style>
+      </p:cxnSp>
     </p:spTree>
     <p:extLst>
       <p:ext uri="{BB962C8B-B14F-4D97-AF65-F5344CB8AC3E}">
@@ -4991,13 +5119,13 @@
   <p:clrMapOvr>
     <a:masterClrMapping/>
   </p:clrMapOvr>
-  <mc:AlternateContent xmlns:mc="http://schemas.openxmlformats.org/markup-compatibility/2006">
-    <mc:Choice xmlns:p159="http://schemas.microsoft.com/office/powerpoint/2015/09/main" Requires="p159">
+  <mc:AlternateContent xmlns:mc="http://schemas.openxmlformats.org/markup-compatibility/2006" xmlns:p159="http://schemas.microsoft.com/office/powerpoint/2015/09/main">
+    <mc:Choice Requires="p159">
       <p:transition xmlns:p14="http://schemas.microsoft.com/office/powerpoint/2010/main" spd="slow" p14:dur="2000">
         <p159:morph option="byObject"/>
       </p:transition>
     </mc:Choice>
-    <mc:Fallback>
+    <mc:Fallback xmlns="">
       <p:transition spd="slow">
         <p:fade/>
       </p:transition>
@@ -5212,11 +5340,11 @@
   <p:clrMapOvr>
     <a:masterClrMapping/>
   </p:clrMapOvr>
-  <mc:AlternateContent xmlns:mc="http://schemas.openxmlformats.org/markup-compatibility/2006">
-    <mc:Choice xmlns:p14="http://schemas.microsoft.com/office/powerpoint/2010/main" Requires="p14">
+  <mc:AlternateContent xmlns:mc="http://schemas.openxmlformats.org/markup-compatibility/2006" xmlns:p14="http://schemas.microsoft.com/office/powerpoint/2010/main">
+    <mc:Choice Requires="p14">
       <p:transition p14:dur="10"/>
     </mc:Choice>
-    <mc:Fallback>
+    <mc:Fallback xmlns="">
       <p:transition/>
     </mc:Fallback>
   </mc:AlternateContent>
@@ -5368,53 +5496,6 @@
           </a:p>
         </p:txBody>
       </p:sp>
-      <p:cxnSp>
-        <p:nvCxnSpPr>
-          <p:cNvPr id="16" name="Straight Arrow Connector 15">
-            <a:extLst>
-              <a:ext uri="{FF2B5EF4-FFF2-40B4-BE49-F238E27FC236}">
-                <a16:creationId xmlns:a16="http://schemas.microsoft.com/office/drawing/2014/main" id="{5900E65F-835D-267E-EF66-EA708D0F2E96}"/>
-              </a:ext>
-            </a:extLst>
-          </p:cNvPr>
-          <p:cNvCxnSpPr>
-            <a:cxnSpLocks/>
-          </p:cNvCxnSpPr>
-          <p:nvPr/>
-        </p:nvCxnSpPr>
-        <p:spPr>
-          <a:xfrm flipV="1">
-            <a:off x="685800" y="4059399"/>
-            <a:ext cx="3538699" cy="1668301"/>
-          </a:xfrm>
-          <a:prstGeom prst="straightConnector1">
-            <a:avLst/>
-          </a:prstGeom>
-          <a:ln w="19050" cap="flat" cmpd="sng" algn="ctr">
-            <a:solidFill>
-              <a:schemeClr val="accent2"/>
-            </a:solidFill>
-            <a:prstDash val="solid"/>
-            <a:round/>
-            <a:headEnd type="arrow" w="med" len="med"/>
-            <a:tailEnd type="arrow" w="med" len="med"/>
-          </a:ln>
-        </p:spPr>
-        <p:style>
-          <a:lnRef idx="0">
-            <a:scrgbClr r="0" g="0" b="0"/>
-          </a:lnRef>
-          <a:fillRef idx="0">
-            <a:scrgbClr r="0" g="0" b="0"/>
-          </a:fillRef>
-          <a:effectRef idx="0">
-            <a:scrgbClr r="0" g="0" b="0"/>
-          </a:effectRef>
-          <a:fontRef idx="minor">
-            <a:schemeClr val="tx1"/>
-          </a:fontRef>
-        </p:style>
-      </p:cxnSp>
       <p:sp>
         <p:nvSpPr>
           <p:cNvPr id="19" name="TextBox 18">
@@ -5528,12 +5609,87 @@
           </a:p>
         </p:txBody>
       </p:sp>
+      <p:sp>
+        <p:nvSpPr>
+          <p:cNvPr id="23" name="TextBox 22">
+            <a:extLst>
+              <a:ext uri="{FF2B5EF4-FFF2-40B4-BE49-F238E27FC236}">
+                <a16:creationId xmlns:a16="http://schemas.microsoft.com/office/drawing/2014/main" id="{C805EC21-187A-6641-173F-8C4F27A44F76}"/>
+              </a:ext>
+            </a:extLst>
+          </p:cNvPr>
+          <p:cNvSpPr txBox="1"/>
+          <p:nvPr/>
+        </p:nvSpPr>
+        <p:spPr>
+          <a:xfrm>
+            <a:off x="8920331" y="4549830"/>
+            <a:ext cx="1526380" cy="461665"/>
+          </a:xfrm>
+          <a:prstGeom prst="rect">
+            <a:avLst/>
+          </a:prstGeom>
+          <a:noFill/>
+        </p:spPr>
+        <p:txBody>
+          <a:bodyPr wrap="none" rtlCol="0">
+            <a:spAutoFit/>
+          </a:bodyPr>
+          <a:lstStyle/>
+          <a:p>
+            <a:pPr marL="0" marR="0" lvl="0" indent="0" algn="l" defTabSz="914400" rtl="0" eaLnBrk="1" fontAlgn="auto" latinLnBrk="0" hangingPunct="1">
+              <a:lnSpc>
+                <a:spcPct val="100000"/>
+              </a:lnSpc>
+              <a:spcBef>
+                <a:spcPts val="0"/>
+              </a:spcBef>
+              <a:spcAft>
+                <a:spcPts val="0"/>
+              </a:spcAft>
+              <a:buClrTx/>
+              <a:buSzTx/>
+              <a:buFontTx/>
+              <a:buNone/>
+              <a:tabLst/>
+              <a:defRPr/>
+            </a:pPr>
+            <a:r>
+              <a:rPr lang="en-SE" sz="2400" dirty="0">
+                <a:solidFill>
+                  <a:srgbClr val="E97132">
+                    <a:lumMod val="75000"/>
+                  </a:srgbClr>
+                </a:solidFill>
+                <a:latin typeface="Aptos" panose="02110004020202020204"/>
+              </a:rPr>
+              <a:t>Subscribe</a:t>
+            </a:r>
+            <a:endParaRPr kumimoji="0" lang="en-SE" sz="2400" b="0" i="0" u="none" strike="noStrike" kern="1200" cap="none" spc="0" normalizeH="0" baseline="0" noProof="0" dirty="0">
+              <a:ln>
+                <a:noFill/>
+              </a:ln>
+              <a:solidFill>
+                <a:srgbClr val="E97132">
+                  <a:lumMod val="75000"/>
+                </a:srgbClr>
+              </a:solidFill>
+              <a:effectLst/>
+              <a:uLnTx/>
+              <a:uFillTx/>
+              <a:latin typeface="Aptos" panose="02110004020202020204"/>
+              <a:ea typeface="+mn-ea"/>
+              <a:cs typeface="+mn-cs"/>
+            </a:endParaRPr>
+          </a:p>
+        </p:txBody>
+      </p:sp>
       <p:cxnSp>
         <p:nvCxnSpPr>
-          <p:cNvPr id="21" name="Curved Connector 20">
-            <a:extLst>
-              <a:ext uri="{FF2B5EF4-FFF2-40B4-BE49-F238E27FC236}">
-                <a16:creationId xmlns:a16="http://schemas.microsoft.com/office/drawing/2014/main" id="{E1E548D9-0EEF-A7AB-E5FB-429DCDCECE5E}"/>
+          <p:cNvPr id="3" name="Straight Arrow Connector 2">
+            <a:extLst>
+              <a:ext uri="{FF2B5EF4-FFF2-40B4-BE49-F238E27FC236}">
+                <a16:creationId xmlns:a16="http://schemas.microsoft.com/office/drawing/2014/main" id="{2723BDCA-AB77-69BC-B549-EB67FF5D8340}"/>
               </a:ext>
             </a:extLst>
           </p:cNvPr>
@@ -5543,17 +5699,14 @@
           <p:nvPr/>
         </p:nvCxnSpPr>
         <p:spPr>
-          <a:xfrm>
-            <a:off x="7518403" y="4529165"/>
-            <a:ext cx="3428997" cy="2112934"/>
+          <a:xfrm flipV="1">
+            <a:off x="771267" y="4067498"/>
+            <a:ext cx="3367764" cy="1672281"/>
           </a:xfrm>
-          <a:prstGeom prst="curvedConnector3">
-            <a:avLst>
-              <a:gd name="adj1" fmla="val 50000"/>
-            </a:avLst>
+          <a:prstGeom prst="straightConnector1">
+            <a:avLst/>
           </a:prstGeom>
           <a:ln>
-            <a:headEnd type="triangle"/>
             <a:tailEnd type="triangle"/>
           </a:ln>
         </p:spPr>
@@ -5572,81 +5725,47 @@
           </a:fontRef>
         </p:style>
       </p:cxnSp>
-      <p:sp>
-        <p:nvSpPr>
-          <p:cNvPr id="23" name="TextBox 22">
-            <a:extLst>
-              <a:ext uri="{FF2B5EF4-FFF2-40B4-BE49-F238E27FC236}">
-                <a16:creationId xmlns:a16="http://schemas.microsoft.com/office/drawing/2014/main" id="{C805EC21-187A-6641-173F-8C4F27A44F76}"/>
-              </a:ext>
-            </a:extLst>
-          </p:cNvPr>
-          <p:cNvSpPr txBox="1"/>
+      <p:cxnSp>
+        <p:nvCxnSpPr>
+          <p:cNvPr id="7" name="Curved Connector 6">
+            <a:extLst>
+              <a:ext uri="{FF2B5EF4-FFF2-40B4-BE49-F238E27FC236}">
+                <a16:creationId xmlns:a16="http://schemas.microsoft.com/office/drawing/2014/main" id="{B813EE21-63C1-4DDB-5249-25B4582DEBBE}"/>
+              </a:ext>
+            </a:extLst>
+          </p:cNvPr>
+          <p:cNvCxnSpPr>
+            <a:cxnSpLocks/>
+          </p:cNvCxnSpPr>
           <p:nvPr/>
-        </p:nvSpPr>
+        </p:nvCxnSpPr>
         <p:spPr>
           <a:xfrm>
-            <a:off x="8920331" y="4549830"/>
-            <a:ext cx="1526380" cy="461665"/>
+            <a:off x="7485452" y="4549830"/>
+            <a:ext cx="3428997" cy="2067697"/>
           </a:xfrm>
-          <a:prstGeom prst="rect">
+          <a:prstGeom prst="curvedConnector3">
             <a:avLst/>
           </a:prstGeom>
-          <a:noFill/>
+          <a:ln>
+            <a:tailEnd type="triangle"/>
+          </a:ln>
         </p:spPr>
-        <p:txBody>
-          <a:bodyPr wrap="none" rtlCol="0">
-            <a:spAutoFit/>
-          </a:bodyPr>
-          <a:lstStyle/>
-          <a:p>
-            <a:pPr marL="0" marR="0" lvl="0" indent="0" algn="l" defTabSz="914400" rtl="0" eaLnBrk="1" fontAlgn="auto" latinLnBrk="0" hangingPunct="1">
-              <a:lnSpc>
-                <a:spcPct val="100000"/>
-              </a:lnSpc>
-              <a:spcBef>
-                <a:spcPts val="0"/>
-              </a:spcBef>
-              <a:spcAft>
-                <a:spcPts val="0"/>
-              </a:spcAft>
-              <a:buClrTx/>
-              <a:buSzTx/>
-              <a:buFontTx/>
-              <a:buNone/>
-              <a:tabLst/>
-              <a:defRPr/>
-            </a:pPr>
-            <a:r>
-              <a:rPr lang="en-SE" sz="2400" dirty="0">
-                <a:solidFill>
-                  <a:srgbClr val="E97132">
-                    <a:lumMod val="75000"/>
-                  </a:srgbClr>
-                </a:solidFill>
-                <a:latin typeface="Aptos" panose="02110004020202020204"/>
-              </a:rPr>
-              <a:t>Subscribe</a:t>
-            </a:r>
-            <a:endParaRPr kumimoji="0" lang="en-SE" sz="2400" b="0" i="0" u="none" strike="noStrike" kern="1200" cap="none" spc="0" normalizeH="0" baseline="0" noProof="0" dirty="0">
-              <a:ln>
-                <a:noFill/>
-              </a:ln>
-              <a:solidFill>
-                <a:srgbClr val="E97132">
-                  <a:lumMod val="75000"/>
-                </a:srgbClr>
-              </a:solidFill>
-              <a:effectLst/>
-              <a:uLnTx/>
-              <a:uFillTx/>
-              <a:latin typeface="Aptos" panose="02110004020202020204"/>
-              <a:ea typeface="+mn-ea"/>
-              <a:cs typeface="+mn-cs"/>
-            </a:endParaRPr>
-          </a:p>
-        </p:txBody>
-      </p:sp>
+        <p:style>
+          <a:lnRef idx="2">
+            <a:schemeClr val="accent2"/>
+          </a:lnRef>
+          <a:fillRef idx="0">
+            <a:schemeClr val="accent2"/>
+          </a:fillRef>
+          <a:effectRef idx="1">
+            <a:schemeClr val="accent2"/>
+          </a:effectRef>
+          <a:fontRef idx="minor">
+            <a:schemeClr val="tx1"/>
+          </a:fontRef>
+        </p:style>
+      </p:cxnSp>
     </p:spTree>
     <p:extLst>
       <p:ext uri="{BB962C8B-B14F-4D97-AF65-F5344CB8AC3E}">
@@ -5657,13 +5776,13 @@
   <p:clrMapOvr>
     <a:masterClrMapping/>
   </p:clrMapOvr>
-  <mc:AlternateContent xmlns:mc="http://schemas.openxmlformats.org/markup-compatibility/2006">
-    <mc:Choice xmlns:p159="http://schemas.microsoft.com/office/powerpoint/2015/09/main" Requires="p159">
+  <mc:AlternateContent xmlns:mc="http://schemas.openxmlformats.org/markup-compatibility/2006" xmlns:p159="http://schemas.microsoft.com/office/powerpoint/2015/09/main">
+    <mc:Choice Requires="p159">
       <p:transition xmlns:p14="http://schemas.microsoft.com/office/powerpoint/2010/main" spd="slow" p14:dur="2000">
         <p159:morph option="byObject"/>
       </p:transition>
     </mc:Choice>
-    <mc:Fallback>
+    <mc:Fallback xmlns="">
       <p:transition spd="slow">
         <p:fade/>
       </p:transition>
@@ -5850,11 +5969,11 @@
   <p:clrMapOvr>
     <a:masterClrMapping/>
   </p:clrMapOvr>
-  <mc:AlternateContent xmlns:mc="http://schemas.openxmlformats.org/markup-compatibility/2006">
-    <mc:Choice xmlns:p14="http://schemas.microsoft.com/office/powerpoint/2010/main" Requires="p14">
+  <mc:AlternateContent xmlns:mc="http://schemas.openxmlformats.org/markup-compatibility/2006" xmlns:p14="http://schemas.microsoft.com/office/powerpoint/2010/main">
+    <mc:Choice Requires="p14">
       <p:transition p14:dur="10"/>
     </mc:Choice>
-    <mc:Fallback>
+    <mc:Fallback xmlns="">
       <p:transition/>
     </mc:Fallback>
   </mc:AlternateContent>
@@ -5992,68 +6111,21 @@
           </a:p>
         </p:txBody>
       </p:sp>
-      <p:cxnSp>
-        <p:nvCxnSpPr>
-          <p:cNvPr id="16" name="Straight Arrow Connector 15">
-            <a:extLst>
-              <a:ext uri="{FF2B5EF4-FFF2-40B4-BE49-F238E27FC236}">
-                <a16:creationId xmlns:a16="http://schemas.microsoft.com/office/drawing/2014/main" id="{306F396B-CA12-FD42-A078-F70DCBE5F7A5}"/>
-              </a:ext>
-            </a:extLst>
-          </p:cNvPr>
-          <p:cNvCxnSpPr>
-            <a:cxnSpLocks/>
-          </p:cNvCxnSpPr>
+      <p:sp>
+        <p:nvSpPr>
+          <p:cNvPr id="19" name="TextBox 18">
+            <a:extLst>
+              <a:ext uri="{FF2B5EF4-FFF2-40B4-BE49-F238E27FC236}">
+                <a16:creationId xmlns:a16="http://schemas.microsoft.com/office/drawing/2014/main" id="{89B73FB5-B5C3-7D1C-9AD5-10ED160C58A5}"/>
+              </a:ext>
+            </a:extLst>
+          </p:cNvPr>
+          <p:cNvSpPr txBox="1"/>
           <p:nvPr/>
-        </p:nvCxnSpPr>
+        </p:nvSpPr>
         <p:spPr>
           <a:xfrm>
-            <a:off x="1841500" y="698500"/>
-            <a:ext cx="2700499" cy="1963899"/>
-          </a:xfrm>
-          <a:prstGeom prst="straightConnector1">
-            <a:avLst/>
-          </a:prstGeom>
-          <a:ln w="19050" cap="flat" cmpd="sng" algn="ctr">
-            <a:solidFill>
-              <a:schemeClr val="accent2"/>
-            </a:solidFill>
-            <a:prstDash val="solid"/>
-            <a:round/>
-            <a:headEnd type="arrow" w="med" len="med"/>
-            <a:tailEnd type="arrow" w="med" len="med"/>
-          </a:ln>
-        </p:spPr>
-        <p:style>
-          <a:lnRef idx="0">
-            <a:scrgbClr r="0" g="0" b="0"/>
-          </a:lnRef>
-          <a:fillRef idx="0">
-            <a:scrgbClr r="0" g="0" b="0"/>
-          </a:fillRef>
-          <a:effectRef idx="0">
-            <a:scrgbClr r="0" g="0" b="0"/>
-          </a:effectRef>
-          <a:fontRef idx="minor">
-            <a:schemeClr val="tx1"/>
-          </a:fontRef>
-        </p:style>
-      </p:cxnSp>
-      <p:sp>
-        <p:nvSpPr>
-          <p:cNvPr id="19" name="TextBox 18">
-            <a:extLst>
-              <a:ext uri="{FF2B5EF4-FFF2-40B4-BE49-F238E27FC236}">
-                <a16:creationId xmlns:a16="http://schemas.microsoft.com/office/drawing/2014/main" id="{89B73FB5-B5C3-7D1C-9AD5-10ED160C58A5}"/>
-              </a:ext>
-            </a:extLst>
-          </p:cNvPr>
-          <p:cNvSpPr txBox="1"/>
-          <p:nvPr/>
-        </p:nvSpPr>
-        <p:spPr>
-          <a:xfrm>
-            <a:off x="2077614" y="1874999"/>
+            <a:off x="1962284" y="1874999"/>
             <a:ext cx="1753867" cy="461665"/>
           </a:xfrm>
           <a:prstGeom prst="rect">
@@ -6114,12 +6186,71 @@
           </a:p>
         </p:txBody>
       </p:sp>
+      <p:sp>
+        <p:nvSpPr>
+          <p:cNvPr id="23" name="TextBox 22">
+            <a:extLst>
+              <a:ext uri="{FF2B5EF4-FFF2-40B4-BE49-F238E27FC236}">
+                <a16:creationId xmlns:a16="http://schemas.microsoft.com/office/drawing/2014/main" id="{05D9CC02-2940-FC41-9BFF-ADD1871D526E}"/>
+              </a:ext>
+            </a:extLst>
+          </p:cNvPr>
+          <p:cNvSpPr txBox="1"/>
+          <p:nvPr/>
+        </p:nvSpPr>
+        <p:spPr>
+          <a:xfrm>
+            <a:off x="9593431" y="4529163"/>
+            <a:ext cx="1138773" cy="461665"/>
+          </a:xfrm>
+          <a:prstGeom prst="rect">
+            <a:avLst/>
+          </a:prstGeom>
+          <a:noFill/>
+        </p:spPr>
+        <p:txBody>
+          <a:bodyPr wrap="none" rtlCol="0">
+            <a:spAutoFit/>
+          </a:bodyPr>
+          <a:lstStyle/>
+          <a:p>
+            <a:pPr marL="0" marR="0" lvl="0" indent="0" algn="l" defTabSz="914400" rtl="0" eaLnBrk="1" fontAlgn="auto" latinLnBrk="0" hangingPunct="1">
+              <a:lnSpc>
+                <a:spcPct val="100000"/>
+              </a:lnSpc>
+              <a:spcBef>
+                <a:spcPts val="0"/>
+              </a:spcBef>
+              <a:spcAft>
+                <a:spcPts val="0"/>
+              </a:spcAft>
+              <a:buClrTx/>
+              <a:buSzTx/>
+              <a:buFontTx/>
+              <a:buNone/>
+              <a:tabLst/>
+              <a:defRPr/>
+            </a:pPr>
+            <a:r>
+              <a:rPr lang="en-SE" sz="2400" dirty="0">
+                <a:solidFill>
+                  <a:srgbClr val="E97132">
+                    <a:lumMod val="75000"/>
+                  </a:srgbClr>
+                </a:solidFill>
+                <a:latin typeface="Aptos" panose="02110004020202020204"/>
+              </a:rPr>
+              <a:t>Web UI</a:t>
+            </a:r>
+          </a:p>
+        </p:txBody>
+      </p:sp>
       <p:cxnSp>
         <p:nvCxnSpPr>
-          <p:cNvPr id="21" name="Curved Connector 20">
-            <a:extLst>
-              <a:ext uri="{FF2B5EF4-FFF2-40B4-BE49-F238E27FC236}">
-                <a16:creationId xmlns:a16="http://schemas.microsoft.com/office/drawing/2014/main" id="{8DAAD312-4C72-6099-3706-715AB5E618E2}"/>
+          <p:cNvPr id="3" name="Straight Arrow Connector 2">
+            <a:extLst>
+              <a:ext uri="{FF2B5EF4-FFF2-40B4-BE49-F238E27FC236}">
+                <a16:creationId xmlns:a16="http://schemas.microsoft.com/office/drawing/2014/main" id="{A642C33C-7917-ED11-468C-21A62C5AFEB8}"/>
               </a:ext>
             </a:extLst>
           </p:cNvPr>
@@ -6130,16 +6261,13 @@
         </p:nvCxnSpPr>
         <p:spPr>
           <a:xfrm>
-            <a:off x="7982832" y="3579651"/>
-            <a:ext cx="3221199" cy="2806700"/>
+            <a:off x="2026508" y="724930"/>
+            <a:ext cx="2586848" cy="1845275"/>
           </a:xfrm>
-          <a:prstGeom prst="curvedConnector3">
-            <a:avLst>
-              <a:gd name="adj1" fmla="val 50000"/>
-            </a:avLst>
+          <a:prstGeom prst="straightConnector1">
+            <a:avLst/>
           </a:prstGeom>
           <a:ln>
-            <a:headEnd type="triangle"/>
             <a:tailEnd type="triangle"/>
           </a:ln>
         </p:spPr>
@@ -6158,65 +6286,48 @@
           </a:fontRef>
         </p:style>
       </p:cxnSp>
-      <p:sp>
-        <p:nvSpPr>
-          <p:cNvPr id="23" name="TextBox 22">
-            <a:extLst>
-              <a:ext uri="{FF2B5EF4-FFF2-40B4-BE49-F238E27FC236}">
-                <a16:creationId xmlns:a16="http://schemas.microsoft.com/office/drawing/2014/main" id="{05D9CC02-2940-FC41-9BFF-ADD1871D526E}"/>
-              </a:ext>
-            </a:extLst>
-          </p:cNvPr>
-          <p:cNvSpPr txBox="1"/>
+      <p:cxnSp>
+        <p:nvCxnSpPr>
+          <p:cNvPr id="8" name="Curved Connector 7">
+            <a:extLst>
+              <a:ext uri="{FF2B5EF4-FFF2-40B4-BE49-F238E27FC236}">
+                <a16:creationId xmlns:a16="http://schemas.microsoft.com/office/drawing/2014/main" id="{6ED1E2CD-FB7D-4376-076E-1967FE13E3AB}"/>
+              </a:ext>
+            </a:extLst>
+          </p:cNvPr>
+          <p:cNvCxnSpPr>
+            <a:cxnSpLocks/>
+            <a:endCxn id="23" idx="1"/>
+          </p:cNvCxnSpPr>
           <p:nvPr/>
-        </p:nvSpPr>
+        </p:nvCxnSpPr>
         <p:spPr>
           <a:xfrm>
-            <a:off x="9593431" y="4529163"/>
-            <a:ext cx="1138773" cy="461665"/>
+            <a:off x="7816416" y="3429000"/>
+            <a:ext cx="1777015" cy="1330996"/>
           </a:xfrm>
-          <a:prstGeom prst="rect">
+          <a:prstGeom prst="curvedConnector3">
             <a:avLst/>
           </a:prstGeom>
-          <a:noFill/>
+          <a:ln>
+            <a:tailEnd type="triangle"/>
+          </a:ln>
         </p:spPr>
-        <p:txBody>
-          <a:bodyPr wrap="none" rtlCol="0">
-            <a:spAutoFit/>
-          </a:bodyPr>
-          <a:lstStyle/>
-          <a:p>
-            <a:pPr marL="0" marR="0" lvl="0" indent="0" algn="l" defTabSz="914400" rtl="0" eaLnBrk="1" fontAlgn="auto" latinLnBrk="0" hangingPunct="1">
-              <a:lnSpc>
-                <a:spcPct val="100000"/>
-              </a:lnSpc>
-              <a:spcBef>
-                <a:spcPts val="0"/>
-              </a:spcBef>
-              <a:spcAft>
-                <a:spcPts val="0"/>
-              </a:spcAft>
-              <a:buClrTx/>
-              <a:buSzTx/>
-              <a:buFontTx/>
-              <a:buNone/>
-              <a:tabLst/>
-              <a:defRPr/>
-            </a:pPr>
-            <a:r>
-              <a:rPr lang="en-SE" sz="2400" dirty="0">
-                <a:solidFill>
-                  <a:srgbClr val="E97132">
-                    <a:lumMod val="75000"/>
-                  </a:srgbClr>
-                </a:solidFill>
-                <a:latin typeface="Aptos" panose="02110004020202020204"/>
-              </a:rPr>
-              <a:t>Web UI</a:t>
-            </a:r>
-          </a:p>
-        </p:txBody>
-      </p:sp>
+        <p:style>
+          <a:lnRef idx="2">
+            <a:schemeClr val="accent2"/>
+          </a:lnRef>
+          <a:fillRef idx="0">
+            <a:schemeClr val="accent2"/>
+          </a:fillRef>
+          <a:effectRef idx="1">
+            <a:schemeClr val="accent2"/>
+          </a:effectRef>
+          <a:fontRef idx="minor">
+            <a:schemeClr val="tx1"/>
+          </a:fontRef>
+        </p:style>
+      </p:cxnSp>
     </p:spTree>
     <p:extLst>
       <p:ext uri="{BB962C8B-B14F-4D97-AF65-F5344CB8AC3E}">
@@ -6227,13 +6338,13 @@
   <p:clrMapOvr>
     <a:masterClrMapping/>
   </p:clrMapOvr>
-  <mc:AlternateContent xmlns:mc="http://schemas.openxmlformats.org/markup-compatibility/2006">
-    <mc:Choice xmlns:p159="http://schemas.microsoft.com/office/powerpoint/2015/09/main" Requires="p159">
+  <mc:AlternateContent xmlns:mc="http://schemas.openxmlformats.org/markup-compatibility/2006" xmlns:p159="http://schemas.microsoft.com/office/powerpoint/2015/09/main">
+    <mc:Choice Requires="p159">
       <p:transition xmlns:p14="http://schemas.microsoft.com/office/powerpoint/2010/main" spd="slow" p14:dur="2000">
         <p159:morph option="byObject"/>
       </p:transition>
     </mc:Choice>
-    <mc:Fallback>
+    <mc:Fallback xmlns="">
       <p:transition spd="slow">
         <p:fade/>
       </p:transition>

</xml_diff>

<commit_message>
updated the presentation to the new communication flow.
</commit_message>
<xml_diff>
--- a/content/IoT-PoC.pptx
+++ b/content/IoT-PoC.pptx
@@ -8,12 +8,14 @@
     <p:sldId id="256" r:id="rId2"/>
     <p:sldId id="257" r:id="rId3"/>
     <p:sldId id="258" r:id="rId4"/>
-    <p:sldId id="261" r:id="rId5"/>
-    <p:sldId id="260" r:id="rId6"/>
-    <p:sldId id="262" r:id="rId7"/>
-    <p:sldId id="263" r:id="rId8"/>
-    <p:sldId id="264" r:id="rId9"/>
-    <p:sldId id="265" r:id="rId10"/>
+    <p:sldId id="266" r:id="rId5"/>
+    <p:sldId id="267" r:id="rId6"/>
+    <p:sldId id="261" r:id="rId7"/>
+    <p:sldId id="260" r:id="rId8"/>
+    <p:sldId id="262" r:id="rId9"/>
+    <p:sldId id="263" r:id="rId10"/>
+    <p:sldId id="264" r:id="rId11"/>
+    <p:sldId id="265" r:id="rId12"/>
   </p:sldIdLst>
   <p:sldSz cx="12192000" cy="6858000"/>
   <p:notesSz cx="6858000" cy="9144000"/>
@@ -124,6 +126,12 @@
           <p14:sldIdLst>
             <p14:sldId id="257"/>
             <p14:sldId id="258"/>
+          </p14:sldIdLst>
+        </p14:section>
+        <p14:section name="BLE" id="{846F82E0-E344-0946-A261-C455FF3A9C33}">
+          <p14:sldIdLst>
+            <p14:sldId id="266"/>
+            <p14:sldId id="267"/>
           </p14:sldIdLst>
         </p14:section>
         <p14:section name="Macbook" id="{0005D7C9-3648-B84D-BF1C-BC71FC58D9F1}">
@@ -3505,8 +3513,8 @@
           </a:extLst>
         </p:spPr>
       </p:pic>
-      <mc:AlternateContent xmlns:mc="http://schemas.openxmlformats.org/markup-compatibility/2006" xmlns:psez="http://schemas.microsoft.com/office/powerpoint/2016/sectionzoom">
-        <mc:Choice Requires="psez">
+      <mc:AlternateContent xmlns:mc="http://schemas.openxmlformats.org/markup-compatibility/2006">
+        <mc:Choice xmlns:psez="http://schemas.microsoft.com/office/powerpoint/2016/sectionzoom" Requires="psez">
           <p:graphicFrame>
             <p:nvGraphicFramePr>
               <p:cNvPr id="7" name="Section Zoom 6">
@@ -3522,14 +3530,14 @@
               <p:nvPr>
                 <p:extLst>
                   <p:ext uri="{D42A27DB-BD31-4B8C-83A1-F6EECF244321}">
-                    <p14:modId xmlns:p14="http://schemas.microsoft.com/office/powerpoint/2010/main" val="3548801230"/>
+                    <p14:modId xmlns:p14="http://schemas.microsoft.com/office/powerpoint/2010/main" val="4244273671"/>
                   </p:ext>
                 </p:extLst>
               </p:nvPr>
             </p:nvGraphicFramePr>
             <p:xfrm>
-              <a:off x="-203200" y="3445511"/>
-              <a:ext cx="4526844" cy="2546350"/>
+              <a:off x="-168161" y="4147984"/>
+              <a:ext cx="3384321" cy="1903681"/>
             </p:xfrm>
             <a:graphic>
               <a:graphicData uri="http://schemas.microsoft.com/office/powerpoint/2016/sectionzoom">
@@ -3545,7 +3553,7 @@
                       <p166:spPr xmlns:p166="http://schemas.microsoft.com/office/powerpoint/2016/6/main">
                         <a:xfrm>
                           <a:off x="0" y="0"/>
-                          <a:ext cx="4526844" cy="2546350"/>
+                          <a:ext cx="3384321" cy="1903681"/>
                         </a:xfrm>
                         <a:prstGeom prst="rect">
                           <a:avLst/>
@@ -3558,7 +3566,7 @@
             </a:graphic>
           </p:graphicFrame>
         </mc:Choice>
-        <mc:Fallback xmlns="">
+        <mc:Fallback>
           <p:pic>
             <p:nvPicPr>
               <p:cNvPr id="7" name="Section Zoom 6">
@@ -3575,15 +3583,15 @@
               <p:nvPr/>
             </p:nvPicPr>
             <p:blipFill>
-              <a:blip r:embed="rId6"/>
+              <a:blip r:embed="rId4"/>
               <a:stretch>
                 <a:fillRect/>
               </a:stretch>
             </p:blipFill>
             <p:spPr>
               <a:xfrm>
-                <a:off x="-203200" y="3445511"/>
-                <a:ext cx="4526844" cy="2546350"/>
+                <a:off x="-168161" y="4147984"/>
+                <a:ext cx="3384321" cy="1903681"/>
               </a:xfrm>
               <a:prstGeom prst="rect">
                 <a:avLst/>
@@ -3609,14 +3617,14 @@
               <p:nvPr>
                 <p:extLst>
                   <p:ext uri="{D42A27DB-BD31-4B8C-83A1-F6EECF244321}">
-                    <p14:modId xmlns:p14="http://schemas.microsoft.com/office/powerpoint/2010/main" val="2404803377"/>
+                    <p14:modId xmlns:p14="http://schemas.microsoft.com/office/powerpoint/2010/main" val="1017037031"/>
                   </p:ext>
                 </p:extLst>
               </p:nvPr>
             </p:nvGraphicFramePr>
             <p:xfrm>
-              <a:off x="2586415" y="1785621"/>
-              <a:ext cx="5029200" cy="2828925"/>
+              <a:off x="4150822" y="1557954"/>
+              <a:ext cx="3470238" cy="1952009"/>
             </p:xfrm>
             <a:graphic>
               <a:graphicData uri="http://schemas.microsoft.com/office/powerpoint/2016/sectionzoom">
@@ -3624,7 +3632,7 @@
                   <psez:sectionZmObj sectionId="{0005D7C9-3648-B84D-BF1C-BC71FC58D9F1}">
                     <psez:zmPr id="{EAA640DF-B249-9D4A-887E-C920FAD4F89B}" transitionDur="1000" showBg="0">
                       <p166:blipFill xmlns:p166="http://schemas.microsoft.com/office/powerpoint/2016/6/main">
-                        <a:blip r:embed="rId7"/>
+                        <a:blip r:embed="rId6"/>
                         <a:stretch>
                           <a:fillRect/>
                         </a:stretch>
@@ -3632,7 +3640,7 @@
                       <p166:spPr xmlns:p166="http://schemas.microsoft.com/office/powerpoint/2016/6/main">
                         <a:xfrm>
                           <a:off x="0" y="0"/>
-                          <a:ext cx="5029200" cy="2828925"/>
+                          <a:ext cx="3470238" cy="1952009"/>
                         </a:xfrm>
                         <a:prstGeom prst="rect">
                           <a:avLst/>
@@ -3649,7 +3657,7 @@
           <p:pic>
             <p:nvPicPr>
               <p:cNvPr id="9" name="Section Zoom 8">
-                <a:hlinkClick r:id="rId8" action="ppaction://hlinksldjump"/>
+                <a:hlinkClick r:id="rId7" action="ppaction://hlinksldjump"/>
                 <a:extLst>
                   <a:ext uri="{FF2B5EF4-FFF2-40B4-BE49-F238E27FC236}">
                     <a16:creationId xmlns:a16="http://schemas.microsoft.com/office/drawing/2014/main" id="{AEBF6B72-D5D3-F218-63FF-F703E2240EEB}"/>
@@ -3662,15 +3670,15 @@
               <p:nvPr/>
             </p:nvPicPr>
             <p:blipFill>
-              <a:blip r:embed="rId7"/>
+              <a:blip r:embed="rId6"/>
               <a:stretch>
                 <a:fillRect/>
               </a:stretch>
             </p:blipFill>
             <p:spPr>
               <a:xfrm>
-                <a:off x="2586415" y="1785621"/>
-                <a:ext cx="5029200" cy="2828925"/>
+                <a:off x="4150822" y="1557954"/>
+                <a:ext cx="3470238" cy="1952009"/>
               </a:xfrm>
               <a:prstGeom prst="rect">
                 <a:avLst/>
@@ -3679,8 +3687,8 @@
           </p:pic>
         </mc:Fallback>
       </mc:AlternateContent>
-      <mc:AlternateContent xmlns:mc="http://schemas.openxmlformats.org/markup-compatibility/2006" xmlns:psez="http://schemas.microsoft.com/office/powerpoint/2016/sectionzoom">
-        <mc:Choice Requires="psez">
+      <mc:AlternateContent xmlns:mc="http://schemas.openxmlformats.org/markup-compatibility/2006">
+        <mc:Choice xmlns:psez="http://schemas.microsoft.com/office/powerpoint/2016/sectionzoom" Requires="psez">
           <p:graphicFrame>
             <p:nvGraphicFramePr>
               <p:cNvPr id="11" name="Section Zoom 10">
@@ -3696,14 +3704,14 @@
               <p:nvPr>
                 <p:extLst>
                   <p:ext uri="{D42A27DB-BD31-4B8C-83A1-F6EECF244321}">
-                    <p14:modId xmlns:p14="http://schemas.microsoft.com/office/powerpoint/2010/main" val="15518123"/>
+                    <p14:modId xmlns:p14="http://schemas.microsoft.com/office/powerpoint/2010/main" val="1029825041"/>
                   </p:ext>
                 </p:extLst>
               </p:nvPr>
             </p:nvGraphicFramePr>
             <p:xfrm>
-              <a:off x="5702300" y="-301705"/>
-              <a:ext cx="5634990" cy="3169682"/>
+              <a:off x="6474726" y="-208900"/>
+              <a:ext cx="4468899" cy="2513756"/>
             </p:xfrm>
             <a:graphic>
               <a:graphicData uri="http://schemas.microsoft.com/office/powerpoint/2016/sectionzoom">
@@ -3711,7 +3719,7 @@
                   <psez:sectionZmObj sectionId="{2E6CA29B-1E04-BA44-81CA-D93B4B01BC32}">
                     <psez:zmPr id="{AB223ABD-8EEB-E546-BEC6-3AB61A7EDF46}" transitionDur="1000" showBg="0">
                       <p166:blipFill xmlns:p166="http://schemas.microsoft.com/office/powerpoint/2016/6/main">
-                        <a:blip r:embed="rId9"/>
+                        <a:blip r:embed="rId8"/>
                         <a:stretch>
                           <a:fillRect/>
                         </a:stretch>
@@ -3719,7 +3727,7 @@
                       <p166:spPr xmlns:p166="http://schemas.microsoft.com/office/powerpoint/2016/6/main">
                         <a:xfrm>
                           <a:off x="0" y="0"/>
-                          <a:ext cx="5634990" cy="3169682"/>
+                          <a:ext cx="4468899" cy="2513756"/>
                         </a:xfrm>
                         <a:prstGeom prst="rect">
                           <a:avLst/>
@@ -3732,11 +3740,11 @@
             </a:graphic>
           </p:graphicFrame>
         </mc:Choice>
-        <mc:Fallback xmlns="">
+        <mc:Fallback>
           <p:pic>
             <p:nvPicPr>
               <p:cNvPr id="11" name="Section Zoom 10">
-                <a:hlinkClick r:id="rId10" action="ppaction://hlinksldjump"/>
+                <a:hlinkClick r:id="rId9" action="ppaction://hlinksldjump"/>
                 <a:extLst>
                   <a:ext uri="{FF2B5EF4-FFF2-40B4-BE49-F238E27FC236}">
                     <a16:creationId xmlns:a16="http://schemas.microsoft.com/office/drawing/2014/main" id="{927C95C1-D23D-A373-7EFD-30AD3EE06126}"/>
@@ -3749,15 +3757,15 @@
               <p:nvPr/>
             </p:nvPicPr>
             <p:blipFill>
-              <a:blip r:embed="rId11"/>
+              <a:blip r:embed="rId8"/>
               <a:stretch>
                 <a:fillRect/>
               </a:stretch>
             </p:blipFill>
             <p:spPr>
               <a:xfrm>
-                <a:off x="5702300" y="-301705"/>
-                <a:ext cx="5634990" cy="3169682"/>
+                <a:off x="6474726" y="-208900"/>
+                <a:ext cx="4468899" cy="2513756"/>
               </a:xfrm>
               <a:prstGeom prst="rect">
                 <a:avLst/>
@@ -3798,7 +3806,7 @@
                   <psez:sectionZmObj sectionId="{46B29C5F-FED7-5F4D-9793-7D58EDFE9D86}">
                     <psez:zmPr id="{0ADCD9FE-9E6D-6644-9F30-E69CFDD1897F}" transitionDur="1000" showBg="0">
                       <p166:blipFill xmlns:p166="http://schemas.microsoft.com/office/powerpoint/2016/6/main">
-                        <a:blip r:embed="rId12"/>
+                        <a:blip r:embed="rId10"/>
                         <a:stretch>
                           <a:fillRect/>
                         </a:stretch>
@@ -3823,7 +3831,7 @@
           <p:pic>
             <p:nvPicPr>
               <p:cNvPr id="13" name="Section Zoom 12">
-                <a:hlinkClick r:id="rId13" action="ppaction://hlinksldjump"/>
+                <a:hlinkClick r:id="rId11" action="ppaction://hlinksldjump"/>
                 <a:extLst>
                   <a:ext uri="{FF2B5EF4-FFF2-40B4-BE49-F238E27FC236}">
                     <a16:creationId xmlns:a16="http://schemas.microsoft.com/office/drawing/2014/main" id="{D6659529-44CE-5A46-A933-4794CC4A5843}"/>
@@ -3836,7 +3844,7 @@
               <p:nvPr/>
             </p:nvPicPr>
             <p:blipFill>
-              <a:blip r:embed="rId14"/>
+              <a:blip r:embed="rId12"/>
               <a:stretch>
                 <a:fillRect/>
               </a:stretch>
@@ -3868,10 +3876,10 @@
           <p:nvPr/>
         </p:nvPicPr>
         <p:blipFill>
-          <a:blip r:embed="rId15">
+          <a:blip r:embed="rId13">
             <a:extLst>
               <a:ext uri="{96DAC541-7B7A-43D3-8B79-37D633B846F1}">
-                <asvg:svgBlip xmlns:asvg="http://schemas.microsoft.com/office/drawing/2016/SVG/main" r:embed="rId16"/>
+                <asvg:svgBlip xmlns:asvg="http://schemas.microsoft.com/office/drawing/2016/SVG/main" r:embed="rId14"/>
               </a:ext>
             </a:extLst>
           </a:blip>
@@ -3881,8 +3889,8 @@
         </p:blipFill>
         <p:spPr>
           <a:xfrm>
-            <a:off x="686285" y="5278437"/>
-            <a:ext cx="914400" cy="914400"/>
+            <a:off x="1129716" y="5843248"/>
+            <a:ext cx="788568" cy="788568"/>
           </a:xfrm>
           <a:prstGeom prst="rect">
             <a:avLst/>
@@ -3904,10 +3912,10 @@
           <p:nvPr/>
         </p:nvPicPr>
         <p:blipFill>
-          <a:blip r:embed="rId17">
+          <a:blip r:embed="rId15">
             <a:extLst>
               <a:ext uri="{96DAC541-7B7A-43D3-8B79-37D633B846F1}">
-                <asvg:svgBlip xmlns:asvg="http://schemas.microsoft.com/office/drawing/2016/SVG/main" r:embed="rId18"/>
+                <asvg:svgBlip xmlns:asvg="http://schemas.microsoft.com/office/drawing/2016/SVG/main" r:embed="rId16"/>
               </a:ext>
             </a:extLst>
           </a:blip>
@@ -3917,7 +3925,7 @@
         </p:blipFill>
         <p:spPr>
           <a:xfrm>
-            <a:off x="4013764" y="4067177"/>
+            <a:off x="3198208" y="4429919"/>
             <a:ext cx="914400" cy="914400"/>
           </a:xfrm>
           <a:prstGeom prst="rect">
@@ -3940,10 +3948,10 @@
           <p:nvPr/>
         </p:nvPicPr>
         <p:blipFill>
-          <a:blip r:embed="rId19">
+          <a:blip r:embed="rId17">
             <a:extLst>
               <a:ext uri="{96DAC541-7B7A-43D3-8B79-37D633B846F1}">
-                <asvg:svgBlip xmlns:asvg="http://schemas.microsoft.com/office/drawing/2016/SVG/main" r:embed="rId20"/>
+                <asvg:svgBlip xmlns:asvg="http://schemas.microsoft.com/office/drawing/2016/SVG/main" r:embed="rId18"/>
               </a:ext>
             </a:extLst>
           </a:blip>
@@ -3953,7 +3961,7 @@
         </p:blipFill>
         <p:spPr>
           <a:xfrm>
-            <a:off x="7434041" y="2350893"/>
+            <a:off x="5475351" y="3329688"/>
             <a:ext cx="914400" cy="914400"/>
           </a:xfrm>
           <a:prstGeom prst="rect">
@@ -3976,10 +3984,10 @@
           <p:nvPr/>
         </p:nvPicPr>
         <p:blipFill>
-          <a:blip r:embed="rId21">
+          <a:blip r:embed="rId19">
             <a:extLst>
               <a:ext uri="{96DAC541-7B7A-43D3-8B79-37D633B846F1}">
-                <asvg:svgBlip xmlns:asvg="http://schemas.microsoft.com/office/drawing/2016/SVG/main" r:embed="rId22"/>
+                <asvg:svgBlip xmlns:asvg="http://schemas.microsoft.com/office/drawing/2016/SVG/main" r:embed="rId20"/>
               </a:ext>
             </a:extLst>
           </a:blip>
@@ -3989,7 +3997,130 @@
         </p:blipFill>
         <p:spPr>
           <a:xfrm>
-            <a:off x="10060202" y="3901818"/>
+            <a:off x="8246851" y="2074804"/>
+            <a:ext cx="914400" cy="914400"/>
+          </a:xfrm>
+          <a:prstGeom prst="rect">
+            <a:avLst/>
+          </a:prstGeom>
+        </p:spPr>
+      </p:pic>
+      <mc:AlternateContent xmlns:mc="http://schemas.openxmlformats.org/markup-compatibility/2006">
+        <mc:Choice xmlns:psez="http://schemas.microsoft.com/office/powerpoint/2016/sectionzoom" Requires="psez">
+          <p:graphicFrame>
+            <p:nvGraphicFramePr>
+              <p:cNvPr id="19" name="Section Zoom 18">
+                <a:extLst>
+                  <a:ext uri="{FF2B5EF4-FFF2-40B4-BE49-F238E27FC236}">
+                    <a16:creationId xmlns:a16="http://schemas.microsoft.com/office/drawing/2014/main" id="{C1BAC4AC-325B-4AC6-2740-5A62C1F77DA4}"/>
+                  </a:ext>
+                </a:extLst>
+              </p:cNvPr>
+              <p:cNvGraphicFramePr>
+                <a:graphicFrameLocks noChangeAspect="1"/>
+              </p:cNvGraphicFramePr>
+              <p:nvPr>
+                <p:extLst>
+                  <p:ext uri="{D42A27DB-BD31-4B8C-83A1-F6EECF244321}">
+                    <p14:modId xmlns:p14="http://schemas.microsoft.com/office/powerpoint/2010/main" val="1248516985"/>
+                  </p:ext>
+                </p:extLst>
+              </p:nvPr>
+            </p:nvGraphicFramePr>
+            <p:xfrm>
+              <a:off x="2110443" y="2893864"/>
+              <a:ext cx="3048000" cy="1714500"/>
+            </p:xfrm>
+            <a:graphic>
+              <a:graphicData uri="http://schemas.microsoft.com/office/powerpoint/2016/sectionzoom">
+                <psez:sectionZm>
+                  <psez:sectionZmObj sectionId="{846F82E0-E344-0946-A261-C455FF3A9C33}">
+                    <psez:zmPr id="{26F13492-0069-FE4D-B075-8CDDD9A56B89}" transitionDur="1000" showBg="0">
+                      <p166:blipFill xmlns:p166="http://schemas.microsoft.com/office/powerpoint/2016/6/main">
+                        <a:blip r:embed="rId21"/>
+                        <a:stretch>
+                          <a:fillRect/>
+                        </a:stretch>
+                      </p166:blipFill>
+                      <p166:spPr xmlns:p166="http://schemas.microsoft.com/office/powerpoint/2016/6/main">
+                        <a:xfrm>
+                          <a:off x="0" y="0"/>
+                          <a:ext cx="3048000" cy="1714500"/>
+                        </a:xfrm>
+                        <a:prstGeom prst="rect">
+                          <a:avLst/>
+                        </a:prstGeom>
+                      </p166:spPr>
+                    </psez:zmPr>
+                  </psez:sectionZmObj>
+                </psez:sectionZm>
+              </a:graphicData>
+            </a:graphic>
+          </p:graphicFrame>
+        </mc:Choice>
+        <mc:Fallback>
+          <p:pic>
+            <p:nvPicPr>
+              <p:cNvPr id="19" name="Section Zoom 18">
+                <a:hlinkClick r:id="rId22" action="ppaction://hlinksldjump"/>
+                <a:extLst>
+                  <a:ext uri="{FF2B5EF4-FFF2-40B4-BE49-F238E27FC236}">
+                    <a16:creationId xmlns:a16="http://schemas.microsoft.com/office/drawing/2014/main" id="{C1BAC4AC-325B-4AC6-2740-5A62C1F77DA4}"/>
+                  </a:ext>
+                </a:extLst>
+              </p:cNvPr>
+              <p:cNvPicPr>
+                <a:picLocks noGrp="1" noRot="1" noChangeAspect="1" noMove="1" noResize="1" noEditPoints="1" noAdjustHandles="1" noChangeArrowheads="1" noChangeShapeType="1"/>
+              </p:cNvPicPr>
+              <p:nvPr/>
+            </p:nvPicPr>
+            <p:blipFill>
+              <a:blip r:embed="rId21"/>
+              <a:stretch>
+                <a:fillRect/>
+              </a:stretch>
+            </p:blipFill>
+            <p:spPr>
+              <a:xfrm>
+                <a:off x="2110443" y="2893864"/>
+                <a:ext cx="3048000" cy="1714500"/>
+              </a:xfrm>
+              <a:prstGeom prst="rect">
+                <a:avLst/>
+              </a:prstGeom>
+            </p:spPr>
+          </p:pic>
+        </mc:Fallback>
+      </mc:AlternateContent>
+      <p:pic>
+        <p:nvPicPr>
+          <p:cNvPr id="21" name="Graphic 20" descr="Badge 5 with solid fill">
+            <a:extLst>
+              <a:ext uri="{FF2B5EF4-FFF2-40B4-BE49-F238E27FC236}">
+                <a16:creationId xmlns:a16="http://schemas.microsoft.com/office/drawing/2014/main" id="{D8FFCB68-004C-8AED-592D-0309D6DCA856}"/>
+              </a:ext>
+            </a:extLst>
+          </p:cNvPr>
+          <p:cNvPicPr>
+            <a:picLocks noChangeAspect="1"/>
+          </p:cNvPicPr>
+          <p:nvPr/>
+        </p:nvPicPr>
+        <p:blipFill>
+          <a:blip r:embed="rId23">
+            <a:extLst>
+              <a:ext uri="{96DAC541-7B7A-43D3-8B79-37D633B846F1}">
+                <asvg:svgBlip xmlns:asvg="http://schemas.microsoft.com/office/drawing/2016/SVG/main" r:embed="rId24"/>
+              </a:ext>
+            </a:extLst>
+          </a:blip>
+          <a:stretch>
+            <a:fillRect/>
+          </a:stretch>
+        </p:blipFill>
+        <p:spPr>
+          <a:xfrm>
+            <a:off x="10717918" y="4175878"/>
             <a:ext cx="914400" cy="914400"/>
           </a:xfrm>
           <a:prstGeom prst="rect">
@@ -4076,6 +4207,568 @@
 </p:sld>
 </file>
 
+<file path=ppt/slides/slide10.xml><?xml version="1.0" encoding="utf-8"?>
+<p:sld xmlns:a="http://schemas.openxmlformats.org/drawingml/2006/main" xmlns:r="http://schemas.openxmlformats.org/officeDocument/2006/relationships" xmlns:p="http://schemas.openxmlformats.org/presentationml/2006/main">
+  <p:cSld>
+    <p:bg>
+      <p:bgPr>
+        <a:solidFill>
+          <a:schemeClr val="tx1">
+            <a:lumMod val="85000"/>
+            <a:lumOff val="15000"/>
+          </a:schemeClr>
+        </a:solidFill>
+        <a:effectLst/>
+      </p:bgPr>
+    </p:bg>
+    <p:spTree>
+      <p:nvGrpSpPr>
+        <p:cNvPr id="1" name="">
+          <a:extLst>
+            <a:ext uri="{FF2B5EF4-FFF2-40B4-BE49-F238E27FC236}">
+              <a16:creationId xmlns:a16="http://schemas.microsoft.com/office/drawing/2014/main" id="{44DA2C82-68F1-988B-0607-BD783EE86083}"/>
+            </a:ext>
+          </a:extLst>
+        </p:cNvPr>
+        <p:cNvGrpSpPr/>
+        <p:nvPr/>
+      </p:nvGrpSpPr>
+      <p:grpSpPr>
+        <a:xfrm>
+          <a:off x="0" y="0"/>
+          <a:ext cx="0" cy="0"/>
+          <a:chOff x="0" y="0"/>
+          <a:chExt cx="0" cy="0"/>
+        </a:xfrm>
+      </p:grpSpPr>
+      <p:sp>
+        <p:nvSpPr>
+          <p:cNvPr id="4" name="Oval 3">
+            <a:extLst>
+              <a:ext uri="{FF2B5EF4-FFF2-40B4-BE49-F238E27FC236}">
+                <a16:creationId xmlns:a16="http://schemas.microsoft.com/office/drawing/2014/main" id="{3CBD8A57-7FBA-57F4-E4A8-786134EB7EB8}"/>
+              </a:ext>
+            </a:extLst>
+          </p:cNvPr>
+          <p:cNvSpPr/>
+          <p:nvPr/>
+        </p:nvSpPr>
+        <p:spPr>
+          <a:xfrm>
+            <a:off x="3622040" y="955040"/>
+            <a:ext cx="4947920" cy="4947920"/>
+          </a:xfrm>
+          <a:prstGeom prst="ellipse">
+            <a:avLst/>
+          </a:prstGeom>
+          <a:solidFill>
+            <a:schemeClr val="accent2">
+              <a:lumMod val="60000"/>
+              <a:lumOff val="40000"/>
+              <a:alpha val="52870"/>
+            </a:schemeClr>
+          </a:solidFill>
+          <a:ln w="127000">
+            <a:solidFill>
+              <a:schemeClr val="bg1"/>
+            </a:solidFill>
+          </a:ln>
+        </p:spPr>
+        <p:style>
+          <a:lnRef idx="2">
+            <a:schemeClr val="accent1">
+              <a:shade val="15000"/>
+            </a:schemeClr>
+          </a:lnRef>
+          <a:fillRef idx="1">
+            <a:schemeClr val="accent1"/>
+          </a:fillRef>
+          <a:effectRef idx="0">
+            <a:schemeClr val="accent1"/>
+          </a:effectRef>
+          <a:fontRef idx="minor">
+            <a:schemeClr val="lt1"/>
+          </a:fontRef>
+        </p:style>
+        <p:txBody>
+          <a:bodyPr rtlCol="0" anchor="ctr"/>
+          <a:lstStyle/>
+          <a:p>
+            <a:pPr marL="0" marR="0" lvl="0" indent="0" algn="ctr" defTabSz="914400" rtl="0" eaLnBrk="1" fontAlgn="auto" latinLnBrk="0" hangingPunct="1">
+              <a:lnSpc>
+                <a:spcPct val="100000"/>
+              </a:lnSpc>
+              <a:spcBef>
+                <a:spcPts val="0"/>
+              </a:spcBef>
+              <a:spcAft>
+                <a:spcPts val="0"/>
+              </a:spcAft>
+              <a:buClrTx/>
+              <a:buSzTx/>
+              <a:buFontTx/>
+              <a:buNone/>
+              <a:tabLst/>
+              <a:defRPr/>
+            </a:pPr>
+            <a:r>
+              <a:rPr lang="en-SE" sz="7200" dirty="0">
+                <a:solidFill>
+                  <a:prstClr val="white"/>
+                </a:solidFill>
+                <a:latin typeface="Apple Symbols" panose="02000000000000000000" pitchFamily="2" charset="-79"/>
+                <a:ea typeface="Apple Symbols" panose="02000000000000000000" pitchFamily="2" charset="-79"/>
+                <a:cs typeface="Apple Symbols" panose="02000000000000000000" pitchFamily="2" charset="-79"/>
+              </a:rPr>
+              <a:t>Flet</a:t>
+            </a:r>
+            <a:endParaRPr kumimoji="0" lang="en-SE" sz="7200" b="0" i="0" u="none" strike="noStrike" kern="1200" cap="none" spc="0" normalizeH="0" baseline="0" noProof="0" dirty="0">
+              <a:ln>
+                <a:noFill/>
+              </a:ln>
+              <a:solidFill>
+                <a:prstClr val="white"/>
+              </a:solidFill>
+              <a:effectLst/>
+              <a:uLnTx/>
+              <a:uFillTx/>
+              <a:latin typeface="Apple Symbols" panose="02000000000000000000" pitchFamily="2" charset="-79"/>
+              <a:ea typeface="Apple Symbols" panose="02000000000000000000" pitchFamily="2" charset="-79"/>
+              <a:cs typeface="Apple Symbols" panose="02000000000000000000" pitchFamily="2" charset="-79"/>
+            </a:endParaRPr>
+          </a:p>
+        </p:txBody>
+      </p:sp>
+      <p:pic>
+        <p:nvPicPr>
+          <p:cNvPr id="3" name="Graphic 2" descr="Follow with solid fill">
+            <a:extLst>
+              <a:ext uri="{FF2B5EF4-FFF2-40B4-BE49-F238E27FC236}">
+                <a16:creationId xmlns:a16="http://schemas.microsoft.com/office/drawing/2014/main" id="{D81B917A-57CB-1327-0E6A-7E6E9EC7E6E6}"/>
+              </a:ext>
+            </a:extLst>
+          </p:cNvPr>
+          <p:cNvPicPr>
+            <a:picLocks noChangeAspect="1"/>
+          </p:cNvPicPr>
+          <p:nvPr/>
+        </p:nvPicPr>
+        <p:blipFill>
+          <a:blip r:embed="rId2">
+            <a:extLst>
+              <a:ext uri="{96DAC541-7B7A-43D3-8B79-37D633B846F1}">
+                <asvg:svgBlip xmlns:asvg="http://schemas.microsoft.com/office/drawing/2016/SVG/main" r:embed="rId3"/>
+              </a:ext>
+            </a:extLst>
+          </a:blip>
+          <a:stretch>
+            <a:fillRect/>
+          </a:stretch>
+        </p:blipFill>
+        <p:spPr>
+          <a:xfrm>
+            <a:off x="5397500" y="1524000"/>
+            <a:ext cx="1397000" cy="1397000"/>
+          </a:xfrm>
+          <a:prstGeom prst="rect">
+            <a:avLst/>
+          </a:prstGeom>
+        </p:spPr>
+      </p:pic>
+    </p:spTree>
+    <p:extLst>
+      <p:ext uri="{BB962C8B-B14F-4D97-AF65-F5344CB8AC3E}">
+        <p14:creationId xmlns:p14="http://schemas.microsoft.com/office/powerpoint/2010/main" val="3551071023"/>
+      </p:ext>
+    </p:extLst>
+  </p:cSld>
+  <p:clrMapOvr>
+    <a:masterClrMapping/>
+  </p:clrMapOvr>
+  <mc:AlternateContent xmlns:mc="http://schemas.openxmlformats.org/markup-compatibility/2006" xmlns:p14="http://schemas.microsoft.com/office/powerpoint/2010/main">
+    <mc:Choice Requires="p14">
+      <p:transition p14:dur="10"/>
+    </mc:Choice>
+    <mc:Fallback xmlns="">
+      <p:transition/>
+    </mc:Fallback>
+  </mc:AlternateContent>
+</p:sld>
+</file>
+
+<file path=ppt/slides/slide11.xml><?xml version="1.0" encoding="utf-8"?>
+<p:sld xmlns:a="http://schemas.openxmlformats.org/drawingml/2006/main" xmlns:r="http://schemas.openxmlformats.org/officeDocument/2006/relationships" xmlns:p="http://schemas.openxmlformats.org/presentationml/2006/main">
+  <p:cSld>
+    <p:bg>
+      <p:bgPr>
+        <a:blipFill dpi="0" rotWithShape="1">
+          <a:blip r:embed="rId2">
+            <a:extLst>
+              <a:ext uri="{BEBA8EAE-BF5A-486C-A8C5-ECC9F3942E4B}">
+                <a14:imgProps xmlns:a14="http://schemas.microsoft.com/office/drawing/2010/main">
+                  <a14:imgLayer r:embed="rId3">
+                    <a14:imgEffect>
+                      <a14:brightnessContrast bright="-70000"/>
+                    </a14:imgEffect>
+                  </a14:imgLayer>
+                </a14:imgProps>
+              </a:ext>
+            </a:extLst>
+          </a:blip>
+          <a:srcRect/>
+          <a:stretch>
+            <a:fillRect t="-1000" b="-1000"/>
+          </a:stretch>
+        </a:blipFill>
+        <a:effectLst/>
+      </p:bgPr>
+    </p:bg>
+    <p:spTree>
+      <p:nvGrpSpPr>
+        <p:cNvPr id="1" name="">
+          <a:extLst>
+            <a:ext uri="{FF2B5EF4-FFF2-40B4-BE49-F238E27FC236}">
+              <a16:creationId xmlns:a16="http://schemas.microsoft.com/office/drawing/2014/main" id="{1C6ABAFF-072D-0964-1F01-96611AFE1210}"/>
+            </a:ext>
+          </a:extLst>
+        </p:cNvPr>
+        <p:cNvGrpSpPr/>
+        <p:nvPr/>
+      </p:nvGrpSpPr>
+      <p:grpSpPr>
+        <a:xfrm>
+          <a:off x="0" y="0"/>
+          <a:ext cx="0" cy="0"/>
+          <a:chOff x="0" y="0"/>
+          <a:chExt cx="0" cy="0"/>
+        </a:xfrm>
+      </p:grpSpPr>
+      <p:sp>
+        <p:nvSpPr>
+          <p:cNvPr id="14" name="Oval 13">
+            <a:extLst>
+              <a:ext uri="{FF2B5EF4-FFF2-40B4-BE49-F238E27FC236}">
+                <a16:creationId xmlns:a16="http://schemas.microsoft.com/office/drawing/2014/main" id="{654E20EF-27C9-A580-E9F5-46028A7C9510}"/>
+              </a:ext>
+            </a:extLst>
+          </p:cNvPr>
+          <p:cNvSpPr/>
+          <p:nvPr/>
+        </p:nvSpPr>
+        <p:spPr>
+          <a:xfrm>
+            <a:off x="4541999" y="1874999"/>
+            <a:ext cx="3108002" cy="3108002"/>
+          </a:xfrm>
+          <a:prstGeom prst="ellipse">
+            <a:avLst/>
+          </a:prstGeom>
+          <a:solidFill>
+            <a:schemeClr val="accent2">
+              <a:lumMod val="60000"/>
+              <a:lumOff val="40000"/>
+              <a:alpha val="52870"/>
+            </a:schemeClr>
+          </a:solidFill>
+          <a:ln w="127000">
+            <a:solidFill>
+              <a:schemeClr val="bg1"/>
+            </a:solidFill>
+          </a:ln>
+        </p:spPr>
+        <p:style>
+          <a:lnRef idx="2">
+            <a:schemeClr val="accent1">
+              <a:shade val="15000"/>
+            </a:schemeClr>
+          </a:lnRef>
+          <a:fillRef idx="1">
+            <a:schemeClr val="accent1"/>
+          </a:fillRef>
+          <a:effectRef idx="0">
+            <a:schemeClr val="accent1"/>
+          </a:effectRef>
+          <a:fontRef idx="minor">
+            <a:schemeClr val="lt1"/>
+          </a:fontRef>
+        </p:style>
+        <p:txBody>
+          <a:bodyPr rtlCol="0" anchor="ctr"/>
+          <a:lstStyle/>
+          <a:p>
+            <a:pPr marL="0" marR="0" lvl="0" indent="0" algn="ctr" defTabSz="914400" rtl="0" eaLnBrk="1" fontAlgn="auto" latinLnBrk="0" hangingPunct="1">
+              <a:lnSpc>
+                <a:spcPct val="100000"/>
+              </a:lnSpc>
+              <a:spcBef>
+                <a:spcPts val="0"/>
+              </a:spcBef>
+              <a:spcAft>
+                <a:spcPts val="0"/>
+              </a:spcAft>
+              <a:buClrTx/>
+              <a:buSzTx/>
+              <a:buFontTx/>
+              <a:buNone/>
+              <a:tabLst/>
+              <a:defRPr/>
+            </a:pPr>
+            <a:r>
+              <a:rPr lang="en-SE" sz="7200" dirty="0">
+                <a:solidFill>
+                  <a:prstClr val="white"/>
+                </a:solidFill>
+                <a:latin typeface="Apple Symbols" panose="02000000000000000000" pitchFamily="2" charset="-79"/>
+                <a:ea typeface="Apple Symbols" panose="02000000000000000000" pitchFamily="2" charset="-79"/>
+                <a:cs typeface="Apple Symbols" panose="02000000000000000000" pitchFamily="2" charset="-79"/>
+              </a:rPr>
+              <a:t>Flet</a:t>
+            </a:r>
+          </a:p>
+        </p:txBody>
+      </p:sp>
+      <p:sp>
+        <p:nvSpPr>
+          <p:cNvPr id="19" name="TextBox 18">
+            <a:extLst>
+              <a:ext uri="{FF2B5EF4-FFF2-40B4-BE49-F238E27FC236}">
+                <a16:creationId xmlns:a16="http://schemas.microsoft.com/office/drawing/2014/main" id="{89B73FB5-B5C3-7D1C-9AD5-10ED160C58A5}"/>
+              </a:ext>
+            </a:extLst>
+          </p:cNvPr>
+          <p:cNvSpPr txBox="1"/>
+          <p:nvPr/>
+        </p:nvSpPr>
+        <p:spPr>
+          <a:xfrm>
+            <a:off x="1962284" y="1874999"/>
+            <a:ext cx="1753867" cy="461665"/>
+          </a:xfrm>
+          <a:prstGeom prst="rect">
+            <a:avLst/>
+          </a:prstGeom>
+          <a:noFill/>
+        </p:spPr>
+        <p:txBody>
+          <a:bodyPr wrap="square" rtlCol="0">
+            <a:spAutoFit/>
+          </a:bodyPr>
+          <a:lstStyle/>
+          <a:p>
+            <a:pPr marL="0" marR="0" lvl="0" indent="0" algn="l" defTabSz="914400" rtl="0" eaLnBrk="1" fontAlgn="auto" latinLnBrk="0" hangingPunct="1">
+              <a:lnSpc>
+                <a:spcPct val="100000"/>
+              </a:lnSpc>
+              <a:spcBef>
+                <a:spcPts val="0"/>
+              </a:spcBef>
+              <a:spcAft>
+                <a:spcPts val="0"/>
+              </a:spcAft>
+              <a:buClrTx/>
+              <a:buSzTx/>
+              <a:buFontTx/>
+              <a:buNone/>
+              <a:tabLst/>
+              <a:defRPr/>
+            </a:pPr>
+            <a:r>
+              <a:rPr lang="en-SE" sz="2400" dirty="0">
+                <a:solidFill>
+                  <a:srgbClr val="E97132">
+                    <a:lumMod val="75000"/>
+                  </a:srgbClr>
+                </a:solidFill>
+                <a:latin typeface="Aptos" panose="02110004020202020204"/>
+              </a:rPr>
+              <a:t>Temp/ Hum</a:t>
+            </a:r>
+            <a:endParaRPr kumimoji="0" lang="en-SE" sz="2400" b="0" i="0" u="none" strike="noStrike" kern="1200" cap="none" spc="0" normalizeH="0" baseline="0" noProof="0" dirty="0">
+              <a:ln>
+                <a:noFill/>
+              </a:ln>
+              <a:solidFill>
+                <a:srgbClr val="E97132">
+                  <a:lumMod val="75000"/>
+                </a:srgbClr>
+              </a:solidFill>
+              <a:effectLst/>
+              <a:uLnTx/>
+              <a:uFillTx/>
+              <a:latin typeface="Aptos" panose="02110004020202020204"/>
+              <a:ea typeface="+mn-ea"/>
+              <a:cs typeface="+mn-cs"/>
+            </a:endParaRPr>
+          </a:p>
+        </p:txBody>
+      </p:sp>
+      <p:sp>
+        <p:nvSpPr>
+          <p:cNvPr id="23" name="TextBox 22">
+            <a:extLst>
+              <a:ext uri="{FF2B5EF4-FFF2-40B4-BE49-F238E27FC236}">
+                <a16:creationId xmlns:a16="http://schemas.microsoft.com/office/drawing/2014/main" id="{05D9CC02-2940-FC41-9BFF-ADD1871D526E}"/>
+              </a:ext>
+            </a:extLst>
+          </p:cNvPr>
+          <p:cNvSpPr txBox="1"/>
+          <p:nvPr/>
+        </p:nvSpPr>
+        <p:spPr>
+          <a:xfrm>
+            <a:off x="9593431" y="4529163"/>
+            <a:ext cx="1138773" cy="461665"/>
+          </a:xfrm>
+          <a:prstGeom prst="rect">
+            <a:avLst/>
+          </a:prstGeom>
+          <a:noFill/>
+        </p:spPr>
+        <p:txBody>
+          <a:bodyPr wrap="none" rtlCol="0">
+            <a:spAutoFit/>
+          </a:bodyPr>
+          <a:lstStyle/>
+          <a:p>
+            <a:pPr marL="0" marR="0" lvl="0" indent="0" algn="l" defTabSz="914400" rtl="0" eaLnBrk="1" fontAlgn="auto" latinLnBrk="0" hangingPunct="1">
+              <a:lnSpc>
+                <a:spcPct val="100000"/>
+              </a:lnSpc>
+              <a:spcBef>
+                <a:spcPts val="0"/>
+              </a:spcBef>
+              <a:spcAft>
+                <a:spcPts val="0"/>
+              </a:spcAft>
+              <a:buClrTx/>
+              <a:buSzTx/>
+              <a:buFontTx/>
+              <a:buNone/>
+              <a:tabLst/>
+              <a:defRPr/>
+            </a:pPr>
+            <a:r>
+              <a:rPr lang="en-SE" sz="2400" dirty="0">
+                <a:solidFill>
+                  <a:srgbClr val="E97132">
+                    <a:lumMod val="75000"/>
+                  </a:srgbClr>
+                </a:solidFill>
+                <a:latin typeface="Aptos" panose="02110004020202020204"/>
+              </a:rPr>
+              <a:t>Web UI</a:t>
+            </a:r>
+          </a:p>
+        </p:txBody>
+      </p:sp>
+      <p:cxnSp>
+        <p:nvCxnSpPr>
+          <p:cNvPr id="3" name="Straight Arrow Connector 2">
+            <a:extLst>
+              <a:ext uri="{FF2B5EF4-FFF2-40B4-BE49-F238E27FC236}">
+                <a16:creationId xmlns:a16="http://schemas.microsoft.com/office/drawing/2014/main" id="{A642C33C-7917-ED11-468C-21A62C5AFEB8}"/>
+              </a:ext>
+            </a:extLst>
+          </p:cNvPr>
+          <p:cNvCxnSpPr>
+            <a:cxnSpLocks/>
+          </p:cNvCxnSpPr>
+          <p:nvPr/>
+        </p:nvCxnSpPr>
+        <p:spPr>
+          <a:xfrm>
+            <a:off x="1359243" y="255373"/>
+            <a:ext cx="3254113" cy="2314832"/>
+          </a:xfrm>
+          <a:prstGeom prst="straightConnector1">
+            <a:avLst/>
+          </a:prstGeom>
+          <a:ln>
+            <a:tailEnd type="triangle"/>
+          </a:ln>
+        </p:spPr>
+        <p:style>
+          <a:lnRef idx="2">
+            <a:schemeClr val="accent2"/>
+          </a:lnRef>
+          <a:fillRef idx="0">
+            <a:schemeClr val="accent2"/>
+          </a:fillRef>
+          <a:effectRef idx="1">
+            <a:schemeClr val="accent2"/>
+          </a:effectRef>
+          <a:fontRef idx="minor">
+            <a:schemeClr val="tx1"/>
+          </a:fontRef>
+        </p:style>
+      </p:cxnSp>
+      <p:cxnSp>
+        <p:nvCxnSpPr>
+          <p:cNvPr id="8" name="Curved Connector 7">
+            <a:extLst>
+              <a:ext uri="{FF2B5EF4-FFF2-40B4-BE49-F238E27FC236}">
+                <a16:creationId xmlns:a16="http://schemas.microsoft.com/office/drawing/2014/main" id="{6ED1E2CD-FB7D-4376-076E-1967FE13E3AB}"/>
+              </a:ext>
+            </a:extLst>
+          </p:cNvPr>
+          <p:cNvCxnSpPr>
+            <a:cxnSpLocks/>
+            <a:endCxn id="23" idx="1"/>
+          </p:cNvCxnSpPr>
+          <p:nvPr/>
+        </p:nvCxnSpPr>
+        <p:spPr>
+          <a:xfrm>
+            <a:off x="7816416" y="3429000"/>
+            <a:ext cx="1777015" cy="1330996"/>
+          </a:xfrm>
+          <a:prstGeom prst="curvedConnector3">
+            <a:avLst/>
+          </a:prstGeom>
+          <a:ln>
+            <a:tailEnd type="triangle"/>
+          </a:ln>
+        </p:spPr>
+        <p:style>
+          <a:lnRef idx="2">
+            <a:schemeClr val="accent2"/>
+          </a:lnRef>
+          <a:fillRef idx="0">
+            <a:schemeClr val="accent2"/>
+          </a:fillRef>
+          <a:effectRef idx="1">
+            <a:schemeClr val="accent2"/>
+          </a:effectRef>
+          <a:fontRef idx="minor">
+            <a:schemeClr val="tx1"/>
+          </a:fontRef>
+        </p:style>
+      </p:cxnSp>
+    </p:spTree>
+    <p:extLst>
+      <p:ext uri="{BB962C8B-B14F-4D97-AF65-F5344CB8AC3E}">
+        <p14:creationId xmlns:p14="http://schemas.microsoft.com/office/powerpoint/2010/main" val="573008012"/>
+      </p:ext>
+    </p:extLst>
+  </p:cSld>
+  <p:clrMapOvr>
+    <a:masterClrMapping/>
+  </p:clrMapOvr>
+  <mc:AlternateContent xmlns:mc="http://schemas.openxmlformats.org/markup-compatibility/2006" xmlns:p159="http://schemas.microsoft.com/office/powerpoint/2015/09/main">
+    <mc:Choice Requires="p159">
+      <p:transition xmlns:p14="http://schemas.microsoft.com/office/powerpoint/2010/main" spd="slow" p14:dur="2000">
+        <p159:morph option="byObject"/>
+      </p:transition>
+    </mc:Choice>
+    <mc:Fallback xmlns="">
+      <p:transition spd="slow">
+        <p:fade/>
+      </p:transition>
+    </mc:Fallback>
+  </mc:AlternateContent>
+</p:sld>
+</file>
+
 <file path=ppt/slides/slide2.xml><?xml version="1.0" encoding="utf-8"?>
 <p:sld xmlns:a="http://schemas.openxmlformats.org/drawingml/2006/main" xmlns:r="http://schemas.openxmlformats.org/officeDocument/2006/relationships" xmlns:p="http://schemas.openxmlformats.org/presentationml/2006/main">
   <p:cSld>
@@ -4424,7 +5117,7 @@
         <p:spPr>
           <a:xfrm>
             <a:off x="8435352" y="1186965"/>
-            <a:ext cx="875561" cy="461665"/>
+            <a:ext cx="696024" cy="461665"/>
           </a:xfrm>
           <a:prstGeom prst="rect">
             <a:avLst/>
@@ -4445,34 +5138,30 @@
                   </a:schemeClr>
                 </a:solidFill>
               </a:rPr>
-              <a:t>HTTP</a:t>
+              <a:t>BLE</a:t>
             </a:r>
           </a:p>
         </p:txBody>
       </p:sp>
       <p:cxnSp>
         <p:nvCxnSpPr>
-          <p:cNvPr id="3" name="Curved Connector 2">
-            <a:extLst>
-              <a:ext uri="{FF2B5EF4-FFF2-40B4-BE49-F238E27FC236}">
-                <a16:creationId xmlns:a16="http://schemas.microsoft.com/office/drawing/2014/main" id="{2CE2ED6C-100F-DD08-D568-FFFFDDA64453}"/>
-              </a:ext>
-            </a:extLst>
-          </p:cNvPr>
-          <p:cNvCxnSpPr>
-            <a:cxnSpLocks/>
-          </p:cNvCxnSpPr>
+          <p:cNvPr id="11" name="Straight Arrow Connector 10">
+            <a:extLst>
+              <a:ext uri="{FF2B5EF4-FFF2-40B4-BE49-F238E27FC236}">
+                <a16:creationId xmlns:a16="http://schemas.microsoft.com/office/drawing/2014/main" id="{07454D34-2296-02F8-0177-52FB7E45BE22}"/>
+              </a:ext>
+            </a:extLst>
+          </p:cNvPr>
+          <p:cNvCxnSpPr/>
           <p:nvPr/>
         </p:nvCxnSpPr>
         <p:spPr>
-          <a:xfrm flipV="1">
-            <a:off x="7764301" y="428367"/>
-            <a:ext cx="3143078" cy="2718487"/>
+          <a:xfrm>
+            <a:off x="3513299" y="1874999"/>
+            <a:ext cx="914400" cy="914400"/>
           </a:xfrm>
-          <a:prstGeom prst="curvedConnector3">
-            <a:avLst>
-              <a:gd name="adj1" fmla="val 50000"/>
-            </a:avLst>
+          <a:prstGeom prst="straightConnector1">
+            <a:avLst/>
           </a:prstGeom>
           <a:ln>
             <a:tailEnd type="triangle"/>
@@ -4495,20 +5184,22 @@
       </p:cxnSp>
       <p:cxnSp>
         <p:nvCxnSpPr>
-          <p:cNvPr id="11" name="Straight Arrow Connector 10">
-            <a:extLst>
-              <a:ext uri="{FF2B5EF4-FFF2-40B4-BE49-F238E27FC236}">
-                <a16:creationId xmlns:a16="http://schemas.microsoft.com/office/drawing/2014/main" id="{07454D34-2296-02F8-0177-52FB7E45BE22}"/>
-              </a:ext>
-            </a:extLst>
-          </p:cNvPr>
-          <p:cNvCxnSpPr/>
+          <p:cNvPr id="12" name="Straight Arrow Connector 11">
+            <a:extLst>
+              <a:ext uri="{FF2B5EF4-FFF2-40B4-BE49-F238E27FC236}">
+                <a16:creationId xmlns:a16="http://schemas.microsoft.com/office/drawing/2014/main" id="{7735099C-4467-B56D-44B0-B2FEBF66E865}"/>
+              </a:ext>
+            </a:extLst>
+          </p:cNvPr>
+          <p:cNvCxnSpPr>
+            <a:cxnSpLocks/>
+          </p:cNvCxnSpPr>
           <p:nvPr/>
         </p:nvCxnSpPr>
         <p:spPr>
-          <a:xfrm>
-            <a:off x="3513299" y="1874999"/>
-            <a:ext cx="914400" cy="914400"/>
+          <a:xfrm flipV="1">
+            <a:off x="7650001" y="960599"/>
+            <a:ext cx="2421082" cy="1602434"/>
           </a:xfrm>
           <a:prstGeom prst="straightConnector1">
             <a:avLst/>
@@ -4564,8 +5255,8 @@
       <p:bgPr>
         <a:solidFill>
           <a:schemeClr val="tx1">
-            <a:lumMod val="85000"/>
-            <a:lumOff val="15000"/>
+            <a:lumMod val="75000"/>
+            <a:lumOff val="25000"/>
           </a:schemeClr>
         </a:solidFill>
         <a:effectLst/>
@@ -4576,7 +5267,7 @@
         <p:cNvPr id="1" name="">
           <a:extLst>
             <a:ext uri="{FF2B5EF4-FFF2-40B4-BE49-F238E27FC236}">
-              <a16:creationId xmlns:a16="http://schemas.microsoft.com/office/drawing/2014/main" id="{FB237BBA-7188-402B-0165-7A03E0A16912}"/>
+              <a16:creationId xmlns:a16="http://schemas.microsoft.com/office/drawing/2014/main" id="{B931FA25-BFCB-1E3E-E523-2BC96532B1DA}"/>
             </a:ext>
           </a:extLst>
         </p:cNvPr>
@@ -4596,7 +5287,7 @@
           <p:cNvPr id="4" name="Oval 3">
             <a:extLst>
               <a:ext uri="{FF2B5EF4-FFF2-40B4-BE49-F238E27FC236}">
-                <a16:creationId xmlns:a16="http://schemas.microsoft.com/office/drawing/2014/main" id="{4F5F02A6-2C43-8050-B2A0-29CD5D83B850}"/>
+                <a16:creationId xmlns:a16="http://schemas.microsoft.com/office/drawing/2014/main" id="{AE8A500C-BDAC-CCEF-A552-CDB34B7D3251}"/>
               </a:ext>
             </a:extLst>
           </p:cNvPr>
@@ -4644,57 +5335,24 @@
           <a:bodyPr rtlCol="0" anchor="ctr"/>
           <a:lstStyle/>
           <a:p>
-            <a:pPr marL="0" marR="0" lvl="0" indent="0" algn="ctr" defTabSz="914400" rtl="0" eaLnBrk="1" fontAlgn="auto" latinLnBrk="0" hangingPunct="1">
-              <a:lnSpc>
-                <a:spcPct val="100000"/>
-              </a:lnSpc>
-              <a:spcBef>
-                <a:spcPts val="0"/>
-              </a:spcBef>
-              <a:spcAft>
-                <a:spcPts val="0"/>
-              </a:spcAft>
-              <a:buClrTx/>
-              <a:buSzTx/>
-              <a:buFontTx/>
-              <a:buNone/>
-              <a:tabLst/>
-              <a:defRPr/>
-            </a:pPr>
+            <a:pPr algn="ctr"/>
             <a:r>
               <a:rPr lang="en-SE" sz="7200" dirty="0">
-                <a:solidFill>
-                  <a:prstClr val="white"/>
-                </a:solidFill>
                 <a:latin typeface="Apple Symbols" panose="02000000000000000000" pitchFamily="2" charset="-79"/>
                 <a:ea typeface="Apple Symbols" panose="02000000000000000000" pitchFamily="2" charset="-79"/>
                 <a:cs typeface="Apple Symbols" panose="02000000000000000000" pitchFamily="2" charset="-79"/>
               </a:rPr>
-              <a:t>Flask</a:t>
-            </a:r>
-            <a:endParaRPr kumimoji="0" lang="en-SE" sz="7200" b="0" i="0" u="none" strike="noStrike" kern="1200" cap="none" spc="0" normalizeH="0" baseline="0" noProof="0" dirty="0">
-              <a:ln>
-                <a:noFill/>
-              </a:ln>
-              <a:solidFill>
-                <a:prstClr val="white"/>
-              </a:solidFill>
-              <a:effectLst/>
-              <a:uLnTx/>
-              <a:uFillTx/>
-              <a:latin typeface="Apple Symbols" panose="02000000000000000000" pitchFamily="2" charset="-79"/>
-              <a:ea typeface="Apple Symbols" panose="02000000000000000000" pitchFamily="2" charset="-79"/>
-              <a:cs typeface="Apple Symbols" panose="02000000000000000000" pitchFamily="2" charset="-79"/>
-            </a:endParaRPr>
+              <a:t>BLE Server</a:t>
+            </a:r>
           </a:p>
         </p:txBody>
       </p:sp>
       <p:pic>
         <p:nvPicPr>
-          <p:cNvPr id="3" name="Graphic 2" descr="Flask with solid fill">
-            <a:extLst>
-              <a:ext uri="{FF2B5EF4-FFF2-40B4-BE49-F238E27FC236}">
-                <a16:creationId xmlns:a16="http://schemas.microsoft.com/office/drawing/2014/main" id="{D4275A93-CE98-E59E-0935-9CD2356FDB3B}"/>
+          <p:cNvPr id="3" name="Graphic 2" descr="Tooth with solid fill">
+            <a:extLst>
+              <a:ext uri="{FF2B5EF4-FFF2-40B4-BE49-F238E27FC236}">
+                <a16:creationId xmlns:a16="http://schemas.microsoft.com/office/drawing/2014/main" id="{E7446778-DF5A-39FB-F27B-94A5EF1F6737}"/>
               </a:ext>
             </a:extLst>
           </p:cNvPr>
@@ -4717,8 +5375,8 @@
         </p:blipFill>
         <p:spPr>
           <a:xfrm>
-            <a:off x="5314950" y="1282700"/>
-            <a:ext cx="1562100" cy="1562100"/>
+            <a:off x="5638800" y="1381991"/>
+            <a:ext cx="914400" cy="914400"/>
           </a:xfrm>
           <a:prstGeom prst="rect">
             <a:avLst/>
@@ -4728,7 +5386,7 @@
     </p:spTree>
     <p:extLst>
       <p:ext uri="{BB962C8B-B14F-4D97-AF65-F5344CB8AC3E}">
-        <p14:creationId xmlns:p14="http://schemas.microsoft.com/office/powerpoint/2010/main" val="4131266583"/>
+        <p14:creationId xmlns:p14="http://schemas.microsoft.com/office/powerpoint/2010/main" val="3735032729"/>
       </p:ext>
     </p:extLst>
   </p:cSld>
@@ -4758,7 +5416,7 @@
                 <a14:imgProps xmlns:a14="http://schemas.microsoft.com/office/drawing/2010/main">
                   <a14:imgLayer r:embed="rId3">
                     <a14:imgEffect>
-                      <a14:brightnessContrast bright="-70000"/>
+                      <a14:brightnessContrast bright="-60000"/>
                     </a14:imgEffect>
                   </a14:imgLayer>
                 </a14:imgProps>
@@ -4767,7 +5425,7 @@
           </a:blip>
           <a:srcRect/>
           <a:stretch>
-            <a:fillRect t="-1000" b="-1000"/>
+            <a:fillRect t="-17000" b="-17000"/>
           </a:stretch>
         </a:blipFill>
         <a:effectLst/>
@@ -4778,7 +5436,7 @@
         <p:cNvPr id="1" name="">
           <a:extLst>
             <a:ext uri="{FF2B5EF4-FFF2-40B4-BE49-F238E27FC236}">
-              <a16:creationId xmlns:a16="http://schemas.microsoft.com/office/drawing/2014/main" id="{2C292EC4-1B98-AACB-0167-39758D4D7280}"/>
+              <a16:creationId xmlns:a16="http://schemas.microsoft.com/office/drawing/2014/main" id="{AD4295C7-11F7-A9E3-6273-8AAC645E7292}"/>
             </a:ext>
           </a:extLst>
         </p:cNvPr>
@@ -4798,7 +5456,7 @@
           <p:cNvPr id="14" name="Oval 13">
             <a:extLst>
               <a:ext uri="{FF2B5EF4-FFF2-40B4-BE49-F238E27FC236}">
-                <a16:creationId xmlns:a16="http://schemas.microsoft.com/office/drawing/2014/main" id="{015721FE-B699-F900-660F-544843284850}"/>
+                <a16:creationId xmlns:a16="http://schemas.microsoft.com/office/drawing/2014/main" id="{EE3958BE-2508-EC16-9E49-BF2B5A054DED}"/>
               </a:ext>
             </a:extLst>
           </p:cNvPr>
@@ -4872,7 +5530,7 @@
                 <a:ea typeface="Apple Symbols" panose="02000000000000000000" pitchFamily="2" charset="-79"/>
                 <a:cs typeface="Apple Symbols" panose="02000000000000000000" pitchFamily="2" charset="-79"/>
               </a:rPr>
-              <a:t>Flask</a:t>
+              <a:t>BLE</a:t>
             </a:r>
           </a:p>
         </p:txBody>
@@ -4882,7 +5540,7 @@
           <p:cNvPr id="19" name="TextBox 18">
             <a:extLst>
               <a:ext uri="{FF2B5EF4-FFF2-40B4-BE49-F238E27FC236}">
-                <a16:creationId xmlns:a16="http://schemas.microsoft.com/office/drawing/2014/main" id="{E3A25B5F-F3B8-D842-8CB1-B9D372B79368}"/>
+                <a16:creationId xmlns:a16="http://schemas.microsoft.com/office/drawing/2014/main" id="{9A6ECF1E-B081-3178-C794-0C227704130D}"/>
               </a:ext>
             </a:extLst>
           </p:cNvPr>
@@ -4892,7 +5550,7 @@
         <p:spPr>
           <a:xfrm>
             <a:off x="1560281" y="4067498"/>
-            <a:ext cx="1789736" cy="461665"/>
+            <a:ext cx="1789736" cy="830997"/>
           </a:xfrm>
           <a:prstGeom prst="rect">
             <a:avLst/>
@@ -4933,22 +5591,635 @@
               </a:rPr>
               <a:t>Json Object</a:t>
             </a:r>
-            <a:endParaRPr kumimoji="0" lang="en-SE" sz="2400" b="0" i="0" u="none" strike="noStrike" kern="1200" cap="none" spc="0" normalizeH="0" baseline="0" noProof="0" dirty="0">
+          </a:p>
+          <a:p>
+            <a:pPr marL="0" marR="0" lvl="0" indent="0" algn="l" defTabSz="914400" rtl="0" eaLnBrk="1" fontAlgn="auto" latinLnBrk="0" hangingPunct="1">
+              <a:lnSpc>
+                <a:spcPct val="100000"/>
+              </a:lnSpc>
+              <a:spcBef>
+                <a:spcPts val="0"/>
+              </a:spcBef>
+              <a:spcAft>
+                <a:spcPts val="0"/>
+              </a:spcAft>
+              <a:buClrTx/>
+              <a:buSzTx/>
+              <a:buFontTx/>
+              <a:buNone/>
+              <a:tabLst/>
+              <a:defRPr/>
+            </a:pPr>
+            <a:r>
+              <a:rPr kumimoji="0" lang="en-SE" sz="2400" b="0" i="0" u="none" strike="noStrike" kern="1200" cap="none" spc="0" normalizeH="0" baseline="0" noProof="0" dirty="0">
+                <a:ln>
+                  <a:noFill/>
+                </a:ln>
+                <a:solidFill>
+                  <a:srgbClr val="E97132">
+                    <a:lumMod val="75000"/>
+                  </a:srgbClr>
+                </a:solidFill>
+                <a:effectLst/>
+                <a:uLnTx/>
+                <a:uFillTx/>
+                <a:latin typeface="Aptos" panose="02110004020202020204"/>
+                <a:ea typeface="+mn-ea"/>
+                <a:cs typeface="+mn-cs"/>
+              </a:rPr>
+              <a:t>BLE</a:t>
+            </a:r>
+          </a:p>
+        </p:txBody>
+      </p:sp>
+      <p:sp>
+        <p:nvSpPr>
+          <p:cNvPr id="23" name="TextBox 22">
+            <a:extLst>
+              <a:ext uri="{FF2B5EF4-FFF2-40B4-BE49-F238E27FC236}">
+                <a16:creationId xmlns:a16="http://schemas.microsoft.com/office/drawing/2014/main" id="{07FF5767-FAA8-3DB3-CF3D-B3E64CE4ECA9}"/>
+              </a:ext>
+            </a:extLst>
+          </p:cNvPr>
+          <p:cNvSpPr txBox="1"/>
+          <p:nvPr/>
+        </p:nvSpPr>
+        <p:spPr>
+          <a:xfrm>
+            <a:off x="8067052" y="1451917"/>
+            <a:ext cx="1050288" cy="461665"/>
+          </a:xfrm>
+          <a:prstGeom prst="rect">
+            <a:avLst/>
+          </a:prstGeom>
+          <a:noFill/>
+        </p:spPr>
+        <p:txBody>
+          <a:bodyPr wrap="none" rtlCol="0">
+            <a:spAutoFit/>
+          </a:bodyPr>
+          <a:lstStyle/>
+          <a:p>
+            <a:pPr marL="0" marR="0" lvl="0" indent="0" algn="l" defTabSz="914400" rtl="0" eaLnBrk="1" fontAlgn="auto" latinLnBrk="0" hangingPunct="1">
+              <a:lnSpc>
+                <a:spcPct val="100000"/>
+              </a:lnSpc>
+              <a:spcBef>
+                <a:spcPts val="0"/>
+              </a:spcBef>
+              <a:spcAft>
+                <a:spcPts val="0"/>
+              </a:spcAft>
+              <a:buClrTx/>
+              <a:buSzTx/>
+              <a:buFontTx/>
+              <a:buNone/>
+              <a:tabLst/>
+              <a:defRPr/>
+            </a:pPr>
+            <a:r>
+              <a:rPr kumimoji="0" lang="en-SE" sz="2400" b="0" i="0" u="none" strike="noStrike" kern="1200" cap="none" spc="0" normalizeH="0" baseline="0" noProof="0" dirty="0">
+                <a:ln>
+                  <a:noFill/>
+                </a:ln>
+                <a:solidFill>
+                  <a:srgbClr val="E97132">
+                    <a:lumMod val="75000"/>
+                  </a:srgbClr>
+                </a:solidFill>
+                <a:effectLst/>
+                <a:uLnTx/>
+                <a:uFillTx/>
+                <a:latin typeface="Aptos" panose="02110004020202020204"/>
+                <a:ea typeface="+mn-ea"/>
+                <a:cs typeface="+mn-cs"/>
+              </a:rPr>
+              <a:t>HTTPS</a:t>
+            </a:r>
+          </a:p>
+        </p:txBody>
+      </p:sp>
+      <p:cxnSp>
+        <p:nvCxnSpPr>
+          <p:cNvPr id="3" name="Straight Arrow Connector 2">
+            <a:extLst>
+              <a:ext uri="{FF2B5EF4-FFF2-40B4-BE49-F238E27FC236}">
+                <a16:creationId xmlns:a16="http://schemas.microsoft.com/office/drawing/2014/main" id="{3AC31057-5063-3754-0B04-96E2D0107E2E}"/>
+              </a:ext>
+            </a:extLst>
+          </p:cNvPr>
+          <p:cNvCxnSpPr>
+            <a:cxnSpLocks/>
+          </p:cNvCxnSpPr>
+          <p:nvPr/>
+        </p:nvCxnSpPr>
+        <p:spPr>
+          <a:xfrm flipV="1">
+            <a:off x="815545" y="4159217"/>
+            <a:ext cx="3376002" cy="1647567"/>
+          </a:xfrm>
+          <a:prstGeom prst="straightConnector1">
+            <a:avLst/>
+          </a:prstGeom>
+          <a:ln>
+            <a:tailEnd type="triangle"/>
+          </a:ln>
+        </p:spPr>
+        <p:style>
+          <a:lnRef idx="2">
+            <a:schemeClr val="accent2"/>
+          </a:lnRef>
+          <a:fillRef idx="0">
+            <a:schemeClr val="accent2"/>
+          </a:fillRef>
+          <a:effectRef idx="1">
+            <a:schemeClr val="accent2"/>
+          </a:effectRef>
+          <a:fontRef idx="minor">
+            <a:schemeClr val="tx1"/>
+          </a:fontRef>
+        </p:style>
+      </p:cxnSp>
+      <p:cxnSp>
+        <p:nvCxnSpPr>
+          <p:cNvPr id="2" name="Straight Arrow Connector 1">
+            <a:extLst>
+              <a:ext uri="{FF2B5EF4-FFF2-40B4-BE49-F238E27FC236}">
+                <a16:creationId xmlns:a16="http://schemas.microsoft.com/office/drawing/2014/main" id="{2589B3DF-0DB5-B78F-8D3B-241281EE4EE1}"/>
+              </a:ext>
+            </a:extLst>
+          </p:cNvPr>
+          <p:cNvCxnSpPr>
+            <a:cxnSpLocks/>
+          </p:cNvCxnSpPr>
+          <p:nvPr/>
+        </p:nvCxnSpPr>
+        <p:spPr>
+          <a:xfrm flipV="1">
+            <a:off x="7650001" y="976135"/>
+            <a:ext cx="3376002" cy="1647567"/>
+          </a:xfrm>
+          <a:prstGeom prst="straightConnector1">
+            <a:avLst/>
+          </a:prstGeom>
+          <a:ln>
+            <a:tailEnd type="triangle"/>
+          </a:ln>
+        </p:spPr>
+        <p:style>
+          <a:lnRef idx="2">
+            <a:schemeClr val="accent2"/>
+          </a:lnRef>
+          <a:fillRef idx="0">
+            <a:schemeClr val="accent2"/>
+          </a:fillRef>
+          <a:effectRef idx="1">
+            <a:schemeClr val="accent2"/>
+          </a:effectRef>
+          <a:fontRef idx="minor">
+            <a:schemeClr val="tx1"/>
+          </a:fontRef>
+        </p:style>
+      </p:cxnSp>
+    </p:spTree>
+    <p:extLst>
+      <p:ext uri="{BB962C8B-B14F-4D97-AF65-F5344CB8AC3E}">
+        <p14:creationId xmlns:p14="http://schemas.microsoft.com/office/powerpoint/2010/main" val="3069090889"/>
+      </p:ext>
+    </p:extLst>
+  </p:cSld>
+  <p:clrMapOvr>
+    <a:masterClrMapping/>
+  </p:clrMapOvr>
+  <mc:AlternateContent xmlns:mc="http://schemas.openxmlformats.org/markup-compatibility/2006" xmlns:p159="http://schemas.microsoft.com/office/powerpoint/2015/09/main">
+    <mc:Choice Requires="p159">
+      <p:transition xmlns:p14="http://schemas.microsoft.com/office/powerpoint/2010/main" spd="slow" p14:dur="2000">
+        <p159:morph option="byObject"/>
+      </p:transition>
+    </mc:Choice>
+    <mc:Fallback xmlns="">
+      <p:transition spd="slow">
+        <p:fade/>
+      </p:transition>
+    </mc:Fallback>
+  </mc:AlternateContent>
+</p:sld>
+</file>
+
+<file path=ppt/slides/slide6.xml><?xml version="1.0" encoding="utf-8"?>
+<p:sld xmlns:a="http://schemas.openxmlformats.org/drawingml/2006/main" xmlns:r="http://schemas.openxmlformats.org/officeDocument/2006/relationships" xmlns:p="http://schemas.openxmlformats.org/presentationml/2006/main">
+  <p:cSld>
+    <p:bg>
+      <p:bgPr>
+        <a:solidFill>
+          <a:schemeClr val="tx1">
+            <a:lumMod val="85000"/>
+            <a:lumOff val="15000"/>
+          </a:schemeClr>
+        </a:solidFill>
+        <a:effectLst/>
+      </p:bgPr>
+    </p:bg>
+    <p:spTree>
+      <p:nvGrpSpPr>
+        <p:cNvPr id="1" name="">
+          <a:extLst>
+            <a:ext uri="{FF2B5EF4-FFF2-40B4-BE49-F238E27FC236}">
+              <a16:creationId xmlns:a16="http://schemas.microsoft.com/office/drawing/2014/main" id="{FB237BBA-7188-402B-0165-7A03E0A16912}"/>
+            </a:ext>
+          </a:extLst>
+        </p:cNvPr>
+        <p:cNvGrpSpPr/>
+        <p:nvPr/>
+      </p:nvGrpSpPr>
+      <p:grpSpPr>
+        <a:xfrm>
+          <a:off x="0" y="0"/>
+          <a:ext cx="0" cy="0"/>
+          <a:chOff x="0" y="0"/>
+          <a:chExt cx="0" cy="0"/>
+        </a:xfrm>
+      </p:grpSpPr>
+      <p:sp>
+        <p:nvSpPr>
+          <p:cNvPr id="4" name="Oval 3">
+            <a:extLst>
+              <a:ext uri="{FF2B5EF4-FFF2-40B4-BE49-F238E27FC236}">
+                <a16:creationId xmlns:a16="http://schemas.microsoft.com/office/drawing/2014/main" id="{4F5F02A6-2C43-8050-B2A0-29CD5D83B850}"/>
+              </a:ext>
+            </a:extLst>
+          </p:cNvPr>
+          <p:cNvSpPr/>
+          <p:nvPr/>
+        </p:nvSpPr>
+        <p:spPr>
+          <a:xfrm>
+            <a:off x="3622040" y="955040"/>
+            <a:ext cx="4947920" cy="4947920"/>
+          </a:xfrm>
+          <a:prstGeom prst="ellipse">
+            <a:avLst/>
+          </a:prstGeom>
+          <a:solidFill>
+            <a:schemeClr val="accent2">
+              <a:lumMod val="60000"/>
+              <a:lumOff val="40000"/>
+              <a:alpha val="52870"/>
+            </a:schemeClr>
+          </a:solidFill>
+          <a:ln w="127000">
+            <a:solidFill>
+              <a:schemeClr val="bg1"/>
+            </a:solidFill>
+          </a:ln>
+        </p:spPr>
+        <p:style>
+          <a:lnRef idx="2">
+            <a:schemeClr val="accent1">
+              <a:shade val="15000"/>
+            </a:schemeClr>
+          </a:lnRef>
+          <a:fillRef idx="1">
+            <a:schemeClr val="accent1"/>
+          </a:fillRef>
+          <a:effectRef idx="0">
+            <a:schemeClr val="accent1"/>
+          </a:effectRef>
+          <a:fontRef idx="minor">
+            <a:schemeClr val="lt1"/>
+          </a:fontRef>
+        </p:style>
+        <p:txBody>
+          <a:bodyPr rtlCol="0" anchor="ctr"/>
+          <a:lstStyle/>
+          <a:p>
+            <a:pPr marL="0" marR="0" lvl="0" indent="0" algn="ctr" defTabSz="914400" rtl="0" eaLnBrk="1" fontAlgn="auto" latinLnBrk="0" hangingPunct="1">
+              <a:lnSpc>
+                <a:spcPct val="100000"/>
+              </a:lnSpc>
+              <a:spcBef>
+                <a:spcPts val="0"/>
+              </a:spcBef>
+              <a:spcAft>
+                <a:spcPts val="0"/>
+              </a:spcAft>
+              <a:buClrTx/>
+              <a:buSzTx/>
+              <a:buFontTx/>
+              <a:buNone/>
+              <a:tabLst/>
+              <a:defRPr/>
+            </a:pPr>
+            <a:r>
+              <a:rPr lang="en-SE" sz="7200" dirty="0">
+                <a:solidFill>
+                  <a:prstClr val="white"/>
+                </a:solidFill>
+                <a:latin typeface="Apple Symbols" panose="02000000000000000000" pitchFamily="2" charset="-79"/>
+                <a:ea typeface="Apple Symbols" panose="02000000000000000000" pitchFamily="2" charset="-79"/>
+                <a:cs typeface="Apple Symbols" panose="02000000000000000000" pitchFamily="2" charset="-79"/>
+              </a:rPr>
+              <a:t>Flask</a:t>
+            </a:r>
+            <a:endParaRPr kumimoji="0" lang="en-SE" sz="7200" b="0" i="0" u="none" strike="noStrike" kern="1200" cap="none" spc="0" normalizeH="0" baseline="0" noProof="0" dirty="0">
               <a:ln>
                 <a:noFill/>
               </a:ln>
               <a:solidFill>
-                <a:srgbClr val="E97132">
-                  <a:lumMod val="75000"/>
-                </a:srgbClr>
+                <a:prstClr val="white"/>
               </a:solidFill>
               <a:effectLst/>
               <a:uLnTx/>
               <a:uFillTx/>
-              <a:latin typeface="Aptos" panose="02110004020202020204"/>
-              <a:ea typeface="+mn-ea"/>
-              <a:cs typeface="+mn-cs"/>
+              <a:latin typeface="Apple Symbols" panose="02000000000000000000" pitchFamily="2" charset="-79"/>
+              <a:ea typeface="Apple Symbols" panose="02000000000000000000" pitchFamily="2" charset="-79"/>
+              <a:cs typeface="Apple Symbols" panose="02000000000000000000" pitchFamily="2" charset="-79"/>
             </a:endParaRPr>
+          </a:p>
+        </p:txBody>
+      </p:sp>
+      <p:pic>
+        <p:nvPicPr>
+          <p:cNvPr id="3" name="Graphic 2" descr="Flask with solid fill">
+            <a:extLst>
+              <a:ext uri="{FF2B5EF4-FFF2-40B4-BE49-F238E27FC236}">
+                <a16:creationId xmlns:a16="http://schemas.microsoft.com/office/drawing/2014/main" id="{D4275A93-CE98-E59E-0935-9CD2356FDB3B}"/>
+              </a:ext>
+            </a:extLst>
+          </p:cNvPr>
+          <p:cNvPicPr>
+            <a:picLocks noChangeAspect="1"/>
+          </p:cNvPicPr>
+          <p:nvPr/>
+        </p:nvPicPr>
+        <p:blipFill>
+          <a:blip r:embed="rId2">
+            <a:extLst>
+              <a:ext uri="{96DAC541-7B7A-43D3-8B79-37D633B846F1}">
+                <asvg:svgBlip xmlns:asvg="http://schemas.microsoft.com/office/drawing/2016/SVG/main" r:embed="rId3"/>
+              </a:ext>
+            </a:extLst>
+          </a:blip>
+          <a:stretch>
+            <a:fillRect/>
+          </a:stretch>
+        </p:blipFill>
+        <p:spPr>
+          <a:xfrm>
+            <a:off x="5314950" y="1282700"/>
+            <a:ext cx="1562100" cy="1562100"/>
+          </a:xfrm>
+          <a:prstGeom prst="rect">
+            <a:avLst/>
+          </a:prstGeom>
+        </p:spPr>
+      </p:pic>
+    </p:spTree>
+    <p:extLst>
+      <p:ext uri="{BB962C8B-B14F-4D97-AF65-F5344CB8AC3E}">
+        <p14:creationId xmlns:p14="http://schemas.microsoft.com/office/powerpoint/2010/main" val="4131266583"/>
+      </p:ext>
+    </p:extLst>
+  </p:cSld>
+  <p:clrMapOvr>
+    <a:masterClrMapping/>
+  </p:clrMapOvr>
+  <mc:AlternateContent xmlns:mc="http://schemas.openxmlformats.org/markup-compatibility/2006" xmlns:p14="http://schemas.microsoft.com/office/powerpoint/2010/main">
+    <mc:Choice Requires="p14">
+      <p:transition p14:dur="10"/>
+    </mc:Choice>
+    <mc:Fallback xmlns="">
+      <p:transition/>
+    </mc:Fallback>
+  </mc:AlternateContent>
+</p:sld>
+</file>
+
+<file path=ppt/slides/slide7.xml><?xml version="1.0" encoding="utf-8"?>
+<p:sld xmlns:a="http://schemas.openxmlformats.org/drawingml/2006/main" xmlns:r="http://schemas.openxmlformats.org/officeDocument/2006/relationships" xmlns:p="http://schemas.openxmlformats.org/presentationml/2006/main">
+  <p:cSld>
+    <p:bg>
+      <p:bgPr>
+        <a:blipFill dpi="0" rotWithShape="1">
+          <a:blip r:embed="rId2">
+            <a:extLst>
+              <a:ext uri="{BEBA8EAE-BF5A-486C-A8C5-ECC9F3942E4B}">
+                <a14:imgProps xmlns:a14="http://schemas.microsoft.com/office/drawing/2010/main">
+                  <a14:imgLayer r:embed="rId3">
+                    <a14:imgEffect>
+                      <a14:brightnessContrast bright="-70000"/>
+                    </a14:imgEffect>
+                  </a14:imgLayer>
+                </a14:imgProps>
+              </a:ext>
+            </a:extLst>
+          </a:blip>
+          <a:srcRect/>
+          <a:stretch>
+            <a:fillRect t="-1000" b="-1000"/>
+          </a:stretch>
+        </a:blipFill>
+        <a:effectLst/>
+      </p:bgPr>
+    </p:bg>
+    <p:spTree>
+      <p:nvGrpSpPr>
+        <p:cNvPr id="1" name="">
+          <a:extLst>
+            <a:ext uri="{FF2B5EF4-FFF2-40B4-BE49-F238E27FC236}">
+              <a16:creationId xmlns:a16="http://schemas.microsoft.com/office/drawing/2014/main" id="{2C292EC4-1B98-AACB-0167-39758D4D7280}"/>
+            </a:ext>
+          </a:extLst>
+        </p:cNvPr>
+        <p:cNvGrpSpPr/>
+        <p:nvPr/>
+      </p:nvGrpSpPr>
+      <p:grpSpPr>
+        <a:xfrm>
+          <a:off x="0" y="0"/>
+          <a:ext cx="0" cy="0"/>
+          <a:chOff x="0" y="0"/>
+          <a:chExt cx="0" cy="0"/>
+        </a:xfrm>
+      </p:grpSpPr>
+      <p:sp>
+        <p:nvSpPr>
+          <p:cNvPr id="14" name="Oval 13">
+            <a:extLst>
+              <a:ext uri="{FF2B5EF4-FFF2-40B4-BE49-F238E27FC236}">
+                <a16:creationId xmlns:a16="http://schemas.microsoft.com/office/drawing/2014/main" id="{015721FE-B699-F900-660F-544843284850}"/>
+              </a:ext>
+            </a:extLst>
+          </p:cNvPr>
+          <p:cNvSpPr/>
+          <p:nvPr/>
+        </p:nvSpPr>
+        <p:spPr>
+          <a:xfrm>
+            <a:off x="4541999" y="1874999"/>
+            <a:ext cx="3108002" cy="3108002"/>
+          </a:xfrm>
+          <a:prstGeom prst="ellipse">
+            <a:avLst/>
+          </a:prstGeom>
+          <a:solidFill>
+            <a:schemeClr val="accent2">
+              <a:lumMod val="60000"/>
+              <a:lumOff val="40000"/>
+              <a:alpha val="52870"/>
+            </a:schemeClr>
+          </a:solidFill>
+          <a:ln w="127000">
+            <a:solidFill>
+              <a:schemeClr val="bg1"/>
+            </a:solidFill>
+          </a:ln>
+        </p:spPr>
+        <p:style>
+          <a:lnRef idx="2">
+            <a:schemeClr val="accent1">
+              <a:shade val="15000"/>
+            </a:schemeClr>
+          </a:lnRef>
+          <a:fillRef idx="1">
+            <a:schemeClr val="accent1"/>
+          </a:fillRef>
+          <a:effectRef idx="0">
+            <a:schemeClr val="accent1"/>
+          </a:effectRef>
+          <a:fontRef idx="minor">
+            <a:schemeClr val="lt1"/>
+          </a:fontRef>
+        </p:style>
+        <p:txBody>
+          <a:bodyPr rtlCol="0" anchor="ctr"/>
+          <a:lstStyle/>
+          <a:p>
+            <a:pPr marL="0" marR="0" lvl="0" indent="0" algn="ctr" defTabSz="914400" rtl="0" eaLnBrk="1" fontAlgn="auto" latinLnBrk="0" hangingPunct="1">
+              <a:lnSpc>
+                <a:spcPct val="100000"/>
+              </a:lnSpc>
+              <a:spcBef>
+                <a:spcPts val="0"/>
+              </a:spcBef>
+              <a:spcAft>
+                <a:spcPts val="0"/>
+              </a:spcAft>
+              <a:buClrTx/>
+              <a:buSzTx/>
+              <a:buFontTx/>
+              <a:buNone/>
+              <a:tabLst/>
+              <a:defRPr/>
+            </a:pPr>
+            <a:r>
+              <a:rPr lang="en-SE" sz="7200" dirty="0">
+                <a:solidFill>
+                  <a:prstClr val="white"/>
+                </a:solidFill>
+                <a:latin typeface="Apple Symbols" panose="02000000000000000000" pitchFamily="2" charset="-79"/>
+                <a:ea typeface="Apple Symbols" panose="02000000000000000000" pitchFamily="2" charset="-79"/>
+                <a:cs typeface="Apple Symbols" panose="02000000000000000000" pitchFamily="2" charset="-79"/>
+              </a:rPr>
+              <a:t>Flask</a:t>
+            </a:r>
+          </a:p>
+        </p:txBody>
+      </p:sp>
+      <p:sp>
+        <p:nvSpPr>
+          <p:cNvPr id="19" name="TextBox 18">
+            <a:extLst>
+              <a:ext uri="{FF2B5EF4-FFF2-40B4-BE49-F238E27FC236}">
+                <a16:creationId xmlns:a16="http://schemas.microsoft.com/office/drawing/2014/main" id="{E3A25B5F-F3B8-D842-8CB1-B9D372B79368}"/>
+              </a:ext>
+            </a:extLst>
+          </p:cNvPr>
+          <p:cNvSpPr txBox="1"/>
+          <p:nvPr/>
+        </p:nvSpPr>
+        <p:spPr>
+          <a:xfrm>
+            <a:off x="1560281" y="4067498"/>
+            <a:ext cx="1789736" cy="830997"/>
+          </a:xfrm>
+          <a:prstGeom prst="rect">
+            <a:avLst/>
+          </a:prstGeom>
+          <a:noFill/>
+        </p:spPr>
+        <p:txBody>
+          <a:bodyPr wrap="square" rtlCol="0">
+            <a:spAutoFit/>
+          </a:bodyPr>
+          <a:lstStyle/>
+          <a:p>
+            <a:pPr marL="0" marR="0" lvl="0" indent="0" algn="l" defTabSz="914400" rtl="0" eaLnBrk="1" fontAlgn="auto" latinLnBrk="0" hangingPunct="1">
+              <a:lnSpc>
+                <a:spcPct val="100000"/>
+              </a:lnSpc>
+              <a:spcBef>
+                <a:spcPts val="0"/>
+              </a:spcBef>
+              <a:spcAft>
+                <a:spcPts val="0"/>
+              </a:spcAft>
+              <a:buClrTx/>
+              <a:buSzTx/>
+              <a:buFontTx/>
+              <a:buNone/>
+              <a:tabLst/>
+              <a:defRPr/>
+            </a:pPr>
+            <a:r>
+              <a:rPr lang="en-SE" sz="2400" dirty="0">
+                <a:solidFill>
+                  <a:srgbClr val="E97132">
+                    <a:lumMod val="75000"/>
+                  </a:srgbClr>
+                </a:solidFill>
+                <a:latin typeface="Aptos" panose="02110004020202020204"/>
+              </a:rPr>
+              <a:t>Json Object</a:t>
+            </a:r>
+          </a:p>
+          <a:p>
+            <a:pPr marL="0" marR="0" lvl="0" indent="0" algn="l" defTabSz="914400" rtl="0" eaLnBrk="1" fontAlgn="auto" latinLnBrk="0" hangingPunct="1">
+              <a:lnSpc>
+                <a:spcPct val="100000"/>
+              </a:lnSpc>
+              <a:spcBef>
+                <a:spcPts val="0"/>
+              </a:spcBef>
+              <a:spcAft>
+                <a:spcPts val="0"/>
+              </a:spcAft>
+              <a:buClrTx/>
+              <a:buSzTx/>
+              <a:buFontTx/>
+              <a:buNone/>
+              <a:tabLst/>
+              <a:defRPr/>
+            </a:pPr>
+            <a:r>
+              <a:rPr kumimoji="0" lang="en-SE" sz="2400" b="0" i="0" u="none" strike="noStrike" kern="1200" cap="none" spc="0" normalizeH="0" baseline="0" noProof="0" dirty="0">
+                <a:ln>
+                  <a:noFill/>
+                </a:ln>
+                <a:solidFill>
+                  <a:srgbClr val="E97132">
+                    <a:lumMod val="75000"/>
+                  </a:srgbClr>
+                </a:solidFill>
+                <a:effectLst/>
+                <a:uLnTx/>
+                <a:uFillTx/>
+                <a:latin typeface="Aptos" panose="02110004020202020204"/>
+                <a:ea typeface="+mn-ea"/>
+                <a:cs typeface="+mn-cs"/>
+              </a:rPr>
+              <a:t>HTTPS</a:t>
+            </a:r>
           </a:p>
         </p:txBody>
       </p:sp>
@@ -5134,7 +6405,7 @@
 </p:sld>
 </file>
 
-<file path=ppt/slides/slide6.xml><?xml version="1.0" encoding="utf-8"?>
+<file path=ppt/slides/slide8.xml><?xml version="1.0" encoding="utf-8"?>
 <p:sld xmlns:a="http://schemas.openxmlformats.org/drawingml/2006/main" xmlns:r="http://schemas.openxmlformats.org/officeDocument/2006/relationships" xmlns:p="http://schemas.openxmlformats.org/presentationml/2006/main">
   <p:cSld>
     <p:bg>
@@ -5351,7 +6622,7 @@
 </p:sld>
 </file>
 
-<file path=ppt/slides/slide7.xml><?xml version="1.0" encoding="utf-8"?>
+<file path=ppt/slides/slide9.xml><?xml version="1.0" encoding="utf-8"?>
 <p:sld xmlns:a="http://schemas.openxmlformats.org/drawingml/2006/main" xmlns:r="http://schemas.openxmlformats.org/officeDocument/2006/relationships" xmlns:p="http://schemas.openxmlformats.org/presentationml/2006/main">
   <p:cSld>
     <p:bg>
@@ -5742,7 +7013,7 @@
         <p:spPr>
           <a:xfrm>
             <a:off x="7485452" y="4549830"/>
-            <a:ext cx="3428997" cy="2067697"/>
+            <a:ext cx="3248451" cy="2229911"/>
           </a:xfrm>
           <a:prstGeom prst="curvedConnector3">
             <a:avLst/>
@@ -5770,568 +7041,6 @@
     <p:extLst>
       <p:ext uri="{BB962C8B-B14F-4D97-AF65-F5344CB8AC3E}">
         <p14:creationId xmlns:p14="http://schemas.microsoft.com/office/powerpoint/2010/main" val="249174485"/>
-      </p:ext>
-    </p:extLst>
-  </p:cSld>
-  <p:clrMapOvr>
-    <a:masterClrMapping/>
-  </p:clrMapOvr>
-  <mc:AlternateContent xmlns:mc="http://schemas.openxmlformats.org/markup-compatibility/2006" xmlns:p159="http://schemas.microsoft.com/office/powerpoint/2015/09/main">
-    <mc:Choice Requires="p159">
-      <p:transition xmlns:p14="http://schemas.microsoft.com/office/powerpoint/2010/main" spd="slow" p14:dur="2000">
-        <p159:morph option="byObject"/>
-      </p:transition>
-    </mc:Choice>
-    <mc:Fallback xmlns="">
-      <p:transition spd="slow">
-        <p:fade/>
-      </p:transition>
-    </mc:Fallback>
-  </mc:AlternateContent>
-</p:sld>
-</file>
-
-<file path=ppt/slides/slide8.xml><?xml version="1.0" encoding="utf-8"?>
-<p:sld xmlns:a="http://schemas.openxmlformats.org/drawingml/2006/main" xmlns:r="http://schemas.openxmlformats.org/officeDocument/2006/relationships" xmlns:p="http://schemas.openxmlformats.org/presentationml/2006/main">
-  <p:cSld>
-    <p:bg>
-      <p:bgPr>
-        <a:solidFill>
-          <a:schemeClr val="tx1">
-            <a:lumMod val="85000"/>
-            <a:lumOff val="15000"/>
-          </a:schemeClr>
-        </a:solidFill>
-        <a:effectLst/>
-      </p:bgPr>
-    </p:bg>
-    <p:spTree>
-      <p:nvGrpSpPr>
-        <p:cNvPr id="1" name="">
-          <a:extLst>
-            <a:ext uri="{FF2B5EF4-FFF2-40B4-BE49-F238E27FC236}">
-              <a16:creationId xmlns:a16="http://schemas.microsoft.com/office/drawing/2014/main" id="{44DA2C82-68F1-988B-0607-BD783EE86083}"/>
-            </a:ext>
-          </a:extLst>
-        </p:cNvPr>
-        <p:cNvGrpSpPr/>
-        <p:nvPr/>
-      </p:nvGrpSpPr>
-      <p:grpSpPr>
-        <a:xfrm>
-          <a:off x="0" y="0"/>
-          <a:ext cx="0" cy="0"/>
-          <a:chOff x="0" y="0"/>
-          <a:chExt cx="0" cy="0"/>
-        </a:xfrm>
-      </p:grpSpPr>
-      <p:sp>
-        <p:nvSpPr>
-          <p:cNvPr id="4" name="Oval 3">
-            <a:extLst>
-              <a:ext uri="{FF2B5EF4-FFF2-40B4-BE49-F238E27FC236}">
-                <a16:creationId xmlns:a16="http://schemas.microsoft.com/office/drawing/2014/main" id="{3CBD8A57-7FBA-57F4-E4A8-786134EB7EB8}"/>
-              </a:ext>
-            </a:extLst>
-          </p:cNvPr>
-          <p:cNvSpPr/>
-          <p:nvPr/>
-        </p:nvSpPr>
-        <p:spPr>
-          <a:xfrm>
-            <a:off x="3622040" y="955040"/>
-            <a:ext cx="4947920" cy="4947920"/>
-          </a:xfrm>
-          <a:prstGeom prst="ellipse">
-            <a:avLst/>
-          </a:prstGeom>
-          <a:solidFill>
-            <a:schemeClr val="accent2">
-              <a:lumMod val="60000"/>
-              <a:lumOff val="40000"/>
-              <a:alpha val="52870"/>
-            </a:schemeClr>
-          </a:solidFill>
-          <a:ln w="127000">
-            <a:solidFill>
-              <a:schemeClr val="bg1"/>
-            </a:solidFill>
-          </a:ln>
-        </p:spPr>
-        <p:style>
-          <a:lnRef idx="2">
-            <a:schemeClr val="accent1">
-              <a:shade val="15000"/>
-            </a:schemeClr>
-          </a:lnRef>
-          <a:fillRef idx="1">
-            <a:schemeClr val="accent1"/>
-          </a:fillRef>
-          <a:effectRef idx="0">
-            <a:schemeClr val="accent1"/>
-          </a:effectRef>
-          <a:fontRef idx="minor">
-            <a:schemeClr val="lt1"/>
-          </a:fontRef>
-        </p:style>
-        <p:txBody>
-          <a:bodyPr rtlCol="0" anchor="ctr"/>
-          <a:lstStyle/>
-          <a:p>
-            <a:pPr marL="0" marR="0" lvl="0" indent="0" algn="ctr" defTabSz="914400" rtl="0" eaLnBrk="1" fontAlgn="auto" latinLnBrk="0" hangingPunct="1">
-              <a:lnSpc>
-                <a:spcPct val="100000"/>
-              </a:lnSpc>
-              <a:spcBef>
-                <a:spcPts val="0"/>
-              </a:spcBef>
-              <a:spcAft>
-                <a:spcPts val="0"/>
-              </a:spcAft>
-              <a:buClrTx/>
-              <a:buSzTx/>
-              <a:buFontTx/>
-              <a:buNone/>
-              <a:tabLst/>
-              <a:defRPr/>
-            </a:pPr>
-            <a:r>
-              <a:rPr lang="en-SE" sz="7200" dirty="0">
-                <a:solidFill>
-                  <a:prstClr val="white"/>
-                </a:solidFill>
-                <a:latin typeface="Apple Symbols" panose="02000000000000000000" pitchFamily="2" charset="-79"/>
-                <a:ea typeface="Apple Symbols" panose="02000000000000000000" pitchFamily="2" charset="-79"/>
-                <a:cs typeface="Apple Symbols" panose="02000000000000000000" pitchFamily="2" charset="-79"/>
-              </a:rPr>
-              <a:t>Flet</a:t>
-            </a:r>
-            <a:endParaRPr kumimoji="0" lang="en-SE" sz="7200" b="0" i="0" u="none" strike="noStrike" kern="1200" cap="none" spc="0" normalizeH="0" baseline="0" noProof="0" dirty="0">
-              <a:ln>
-                <a:noFill/>
-              </a:ln>
-              <a:solidFill>
-                <a:prstClr val="white"/>
-              </a:solidFill>
-              <a:effectLst/>
-              <a:uLnTx/>
-              <a:uFillTx/>
-              <a:latin typeface="Apple Symbols" panose="02000000000000000000" pitchFamily="2" charset="-79"/>
-              <a:ea typeface="Apple Symbols" panose="02000000000000000000" pitchFamily="2" charset="-79"/>
-              <a:cs typeface="Apple Symbols" panose="02000000000000000000" pitchFamily="2" charset="-79"/>
-            </a:endParaRPr>
-          </a:p>
-        </p:txBody>
-      </p:sp>
-      <p:pic>
-        <p:nvPicPr>
-          <p:cNvPr id="3" name="Graphic 2" descr="Follow with solid fill">
-            <a:extLst>
-              <a:ext uri="{FF2B5EF4-FFF2-40B4-BE49-F238E27FC236}">
-                <a16:creationId xmlns:a16="http://schemas.microsoft.com/office/drawing/2014/main" id="{D81B917A-57CB-1327-0E6A-7E6E9EC7E6E6}"/>
-              </a:ext>
-            </a:extLst>
-          </p:cNvPr>
-          <p:cNvPicPr>
-            <a:picLocks noChangeAspect="1"/>
-          </p:cNvPicPr>
-          <p:nvPr/>
-        </p:nvPicPr>
-        <p:blipFill>
-          <a:blip r:embed="rId2">
-            <a:extLst>
-              <a:ext uri="{96DAC541-7B7A-43D3-8B79-37D633B846F1}">
-                <asvg:svgBlip xmlns:asvg="http://schemas.microsoft.com/office/drawing/2016/SVG/main" r:embed="rId3"/>
-              </a:ext>
-            </a:extLst>
-          </a:blip>
-          <a:stretch>
-            <a:fillRect/>
-          </a:stretch>
-        </p:blipFill>
-        <p:spPr>
-          <a:xfrm>
-            <a:off x="5397500" y="1524000"/>
-            <a:ext cx="1397000" cy="1397000"/>
-          </a:xfrm>
-          <a:prstGeom prst="rect">
-            <a:avLst/>
-          </a:prstGeom>
-        </p:spPr>
-      </p:pic>
-    </p:spTree>
-    <p:extLst>
-      <p:ext uri="{BB962C8B-B14F-4D97-AF65-F5344CB8AC3E}">
-        <p14:creationId xmlns:p14="http://schemas.microsoft.com/office/powerpoint/2010/main" val="3551071023"/>
-      </p:ext>
-    </p:extLst>
-  </p:cSld>
-  <p:clrMapOvr>
-    <a:masterClrMapping/>
-  </p:clrMapOvr>
-  <mc:AlternateContent xmlns:mc="http://schemas.openxmlformats.org/markup-compatibility/2006" xmlns:p14="http://schemas.microsoft.com/office/powerpoint/2010/main">
-    <mc:Choice Requires="p14">
-      <p:transition p14:dur="10"/>
-    </mc:Choice>
-    <mc:Fallback xmlns="">
-      <p:transition/>
-    </mc:Fallback>
-  </mc:AlternateContent>
-</p:sld>
-</file>
-
-<file path=ppt/slides/slide9.xml><?xml version="1.0" encoding="utf-8"?>
-<p:sld xmlns:a="http://schemas.openxmlformats.org/drawingml/2006/main" xmlns:r="http://schemas.openxmlformats.org/officeDocument/2006/relationships" xmlns:p="http://schemas.openxmlformats.org/presentationml/2006/main">
-  <p:cSld>
-    <p:bg>
-      <p:bgPr>
-        <a:blipFill dpi="0" rotWithShape="1">
-          <a:blip r:embed="rId2">
-            <a:extLst>
-              <a:ext uri="{BEBA8EAE-BF5A-486C-A8C5-ECC9F3942E4B}">
-                <a14:imgProps xmlns:a14="http://schemas.microsoft.com/office/drawing/2010/main">
-                  <a14:imgLayer r:embed="rId3">
-                    <a14:imgEffect>
-                      <a14:brightnessContrast bright="-70000"/>
-                    </a14:imgEffect>
-                  </a14:imgLayer>
-                </a14:imgProps>
-              </a:ext>
-            </a:extLst>
-          </a:blip>
-          <a:srcRect/>
-          <a:stretch>
-            <a:fillRect t="-1000" b="-1000"/>
-          </a:stretch>
-        </a:blipFill>
-        <a:effectLst/>
-      </p:bgPr>
-    </p:bg>
-    <p:spTree>
-      <p:nvGrpSpPr>
-        <p:cNvPr id="1" name="">
-          <a:extLst>
-            <a:ext uri="{FF2B5EF4-FFF2-40B4-BE49-F238E27FC236}">
-              <a16:creationId xmlns:a16="http://schemas.microsoft.com/office/drawing/2014/main" id="{1C6ABAFF-072D-0964-1F01-96611AFE1210}"/>
-            </a:ext>
-          </a:extLst>
-        </p:cNvPr>
-        <p:cNvGrpSpPr/>
-        <p:nvPr/>
-      </p:nvGrpSpPr>
-      <p:grpSpPr>
-        <a:xfrm>
-          <a:off x="0" y="0"/>
-          <a:ext cx="0" cy="0"/>
-          <a:chOff x="0" y="0"/>
-          <a:chExt cx="0" cy="0"/>
-        </a:xfrm>
-      </p:grpSpPr>
-      <p:sp>
-        <p:nvSpPr>
-          <p:cNvPr id="14" name="Oval 13">
-            <a:extLst>
-              <a:ext uri="{FF2B5EF4-FFF2-40B4-BE49-F238E27FC236}">
-                <a16:creationId xmlns:a16="http://schemas.microsoft.com/office/drawing/2014/main" id="{654E20EF-27C9-A580-E9F5-46028A7C9510}"/>
-              </a:ext>
-            </a:extLst>
-          </p:cNvPr>
-          <p:cNvSpPr/>
-          <p:nvPr/>
-        </p:nvSpPr>
-        <p:spPr>
-          <a:xfrm>
-            <a:off x="4541999" y="1874999"/>
-            <a:ext cx="3108002" cy="3108002"/>
-          </a:xfrm>
-          <a:prstGeom prst="ellipse">
-            <a:avLst/>
-          </a:prstGeom>
-          <a:solidFill>
-            <a:schemeClr val="accent2">
-              <a:lumMod val="60000"/>
-              <a:lumOff val="40000"/>
-              <a:alpha val="52870"/>
-            </a:schemeClr>
-          </a:solidFill>
-          <a:ln w="127000">
-            <a:solidFill>
-              <a:schemeClr val="bg1"/>
-            </a:solidFill>
-          </a:ln>
-        </p:spPr>
-        <p:style>
-          <a:lnRef idx="2">
-            <a:schemeClr val="accent1">
-              <a:shade val="15000"/>
-            </a:schemeClr>
-          </a:lnRef>
-          <a:fillRef idx="1">
-            <a:schemeClr val="accent1"/>
-          </a:fillRef>
-          <a:effectRef idx="0">
-            <a:schemeClr val="accent1"/>
-          </a:effectRef>
-          <a:fontRef idx="minor">
-            <a:schemeClr val="lt1"/>
-          </a:fontRef>
-        </p:style>
-        <p:txBody>
-          <a:bodyPr rtlCol="0" anchor="ctr"/>
-          <a:lstStyle/>
-          <a:p>
-            <a:pPr marL="0" marR="0" lvl="0" indent="0" algn="ctr" defTabSz="914400" rtl="0" eaLnBrk="1" fontAlgn="auto" latinLnBrk="0" hangingPunct="1">
-              <a:lnSpc>
-                <a:spcPct val="100000"/>
-              </a:lnSpc>
-              <a:spcBef>
-                <a:spcPts val="0"/>
-              </a:spcBef>
-              <a:spcAft>
-                <a:spcPts val="0"/>
-              </a:spcAft>
-              <a:buClrTx/>
-              <a:buSzTx/>
-              <a:buFontTx/>
-              <a:buNone/>
-              <a:tabLst/>
-              <a:defRPr/>
-            </a:pPr>
-            <a:r>
-              <a:rPr lang="en-SE" sz="7200" dirty="0">
-                <a:solidFill>
-                  <a:prstClr val="white"/>
-                </a:solidFill>
-                <a:latin typeface="Apple Symbols" panose="02000000000000000000" pitchFamily="2" charset="-79"/>
-                <a:ea typeface="Apple Symbols" panose="02000000000000000000" pitchFamily="2" charset="-79"/>
-                <a:cs typeface="Apple Symbols" panose="02000000000000000000" pitchFamily="2" charset="-79"/>
-              </a:rPr>
-              <a:t>Flet</a:t>
-            </a:r>
-          </a:p>
-        </p:txBody>
-      </p:sp>
-      <p:sp>
-        <p:nvSpPr>
-          <p:cNvPr id="19" name="TextBox 18">
-            <a:extLst>
-              <a:ext uri="{FF2B5EF4-FFF2-40B4-BE49-F238E27FC236}">
-                <a16:creationId xmlns:a16="http://schemas.microsoft.com/office/drawing/2014/main" id="{89B73FB5-B5C3-7D1C-9AD5-10ED160C58A5}"/>
-              </a:ext>
-            </a:extLst>
-          </p:cNvPr>
-          <p:cNvSpPr txBox="1"/>
-          <p:nvPr/>
-        </p:nvSpPr>
-        <p:spPr>
-          <a:xfrm>
-            <a:off x="1962284" y="1874999"/>
-            <a:ext cx="1753867" cy="461665"/>
-          </a:xfrm>
-          <a:prstGeom prst="rect">
-            <a:avLst/>
-          </a:prstGeom>
-          <a:noFill/>
-        </p:spPr>
-        <p:txBody>
-          <a:bodyPr wrap="square" rtlCol="0">
-            <a:spAutoFit/>
-          </a:bodyPr>
-          <a:lstStyle/>
-          <a:p>
-            <a:pPr marL="0" marR="0" lvl="0" indent="0" algn="l" defTabSz="914400" rtl="0" eaLnBrk="1" fontAlgn="auto" latinLnBrk="0" hangingPunct="1">
-              <a:lnSpc>
-                <a:spcPct val="100000"/>
-              </a:lnSpc>
-              <a:spcBef>
-                <a:spcPts val="0"/>
-              </a:spcBef>
-              <a:spcAft>
-                <a:spcPts val="0"/>
-              </a:spcAft>
-              <a:buClrTx/>
-              <a:buSzTx/>
-              <a:buFontTx/>
-              <a:buNone/>
-              <a:tabLst/>
-              <a:defRPr/>
-            </a:pPr>
-            <a:r>
-              <a:rPr lang="en-SE" sz="2400" dirty="0">
-                <a:solidFill>
-                  <a:srgbClr val="E97132">
-                    <a:lumMod val="75000"/>
-                  </a:srgbClr>
-                </a:solidFill>
-                <a:latin typeface="Aptos" panose="02110004020202020204"/>
-              </a:rPr>
-              <a:t>Temp/ Hum</a:t>
-            </a:r>
-            <a:endParaRPr kumimoji="0" lang="en-SE" sz="2400" b="0" i="0" u="none" strike="noStrike" kern="1200" cap="none" spc="0" normalizeH="0" baseline="0" noProof="0" dirty="0">
-              <a:ln>
-                <a:noFill/>
-              </a:ln>
-              <a:solidFill>
-                <a:srgbClr val="E97132">
-                  <a:lumMod val="75000"/>
-                </a:srgbClr>
-              </a:solidFill>
-              <a:effectLst/>
-              <a:uLnTx/>
-              <a:uFillTx/>
-              <a:latin typeface="Aptos" panose="02110004020202020204"/>
-              <a:ea typeface="+mn-ea"/>
-              <a:cs typeface="+mn-cs"/>
-            </a:endParaRPr>
-          </a:p>
-        </p:txBody>
-      </p:sp>
-      <p:sp>
-        <p:nvSpPr>
-          <p:cNvPr id="23" name="TextBox 22">
-            <a:extLst>
-              <a:ext uri="{FF2B5EF4-FFF2-40B4-BE49-F238E27FC236}">
-                <a16:creationId xmlns:a16="http://schemas.microsoft.com/office/drawing/2014/main" id="{05D9CC02-2940-FC41-9BFF-ADD1871D526E}"/>
-              </a:ext>
-            </a:extLst>
-          </p:cNvPr>
-          <p:cNvSpPr txBox="1"/>
-          <p:nvPr/>
-        </p:nvSpPr>
-        <p:spPr>
-          <a:xfrm>
-            <a:off x="9593431" y="4529163"/>
-            <a:ext cx="1138773" cy="461665"/>
-          </a:xfrm>
-          <a:prstGeom prst="rect">
-            <a:avLst/>
-          </a:prstGeom>
-          <a:noFill/>
-        </p:spPr>
-        <p:txBody>
-          <a:bodyPr wrap="none" rtlCol="0">
-            <a:spAutoFit/>
-          </a:bodyPr>
-          <a:lstStyle/>
-          <a:p>
-            <a:pPr marL="0" marR="0" lvl="0" indent="0" algn="l" defTabSz="914400" rtl="0" eaLnBrk="1" fontAlgn="auto" latinLnBrk="0" hangingPunct="1">
-              <a:lnSpc>
-                <a:spcPct val="100000"/>
-              </a:lnSpc>
-              <a:spcBef>
-                <a:spcPts val="0"/>
-              </a:spcBef>
-              <a:spcAft>
-                <a:spcPts val="0"/>
-              </a:spcAft>
-              <a:buClrTx/>
-              <a:buSzTx/>
-              <a:buFontTx/>
-              <a:buNone/>
-              <a:tabLst/>
-              <a:defRPr/>
-            </a:pPr>
-            <a:r>
-              <a:rPr lang="en-SE" sz="2400" dirty="0">
-                <a:solidFill>
-                  <a:srgbClr val="E97132">
-                    <a:lumMod val="75000"/>
-                  </a:srgbClr>
-                </a:solidFill>
-                <a:latin typeface="Aptos" panose="02110004020202020204"/>
-              </a:rPr>
-              <a:t>Web UI</a:t>
-            </a:r>
-          </a:p>
-        </p:txBody>
-      </p:sp>
-      <p:cxnSp>
-        <p:nvCxnSpPr>
-          <p:cNvPr id="3" name="Straight Arrow Connector 2">
-            <a:extLst>
-              <a:ext uri="{FF2B5EF4-FFF2-40B4-BE49-F238E27FC236}">
-                <a16:creationId xmlns:a16="http://schemas.microsoft.com/office/drawing/2014/main" id="{A642C33C-7917-ED11-468C-21A62C5AFEB8}"/>
-              </a:ext>
-            </a:extLst>
-          </p:cNvPr>
-          <p:cNvCxnSpPr>
-            <a:cxnSpLocks/>
-          </p:cNvCxnSpPr>
-          <p:nvPr/>
-        </p:nvCxnSpPr>
-        <p:spPr>
-          <a:xfrm>
-            <a:off x="2026508" y="724930"/>
-            <a:ext cx="2586848" cy="1845275"/>
-          </a:xfrm>
-          <a:prstGeom prst="straightConnector1">
-            <a:avLst/>
-          </a:prstGeom>
-          <a:ln>
-            <a:tailEnd type="triangle"/>
-          </a:ln>
-        </p:spPr>
-        <p:style>
-          <a:lnRef idx="2">
-            <a:schemeClr val="accent2"/>
-          </a:lnRef>
-          <a:fillRef idx="0">
-            <a:schemeClr val="accent2"/>
-          </a:fillRef>
-          <a:effectRef idx="1">
-            <a:schemeClr val="accent2"/>
-          </a:effectRef>
-          <a:fontRef idx="minor">
-            <a:schemeClr val="tx1"/>
-          </a:fontRef>
-        </p:style>
-      </p:cxnSp>
-      <p:cxnSp>
-        <p:nvCxnSpPr>
-          <p:cNvPr id="8" name="Curved Connector 7">
-            <a:extLst>
-              <a:ext uri="{FF2B5EF4-FFF2-40B4-BE49-F238E27FC236}">
-                <a16:creationId xmlns:a16="http://schemas.microsoft.com/office/drawing/2014/main" id="{6ED1E2CD-FB7D-4376-076E-1967FE13E3AB}"/>
-              </a:ext>
-            </a:extLst>
-          </p:cNvPr>
-          <p:cNvCxnSpPr>
-            <a:cxnSpLocks/>
-            <a:endCxn id="23" idx="1"/>
-          </p:cNvCxnSpPr>
-          <p:nvPr/>
-        </p:nvCxnSpPr>
-        <p:spPr>
-          <a:xfrm>
-            <a:off x="7816416" y="3429000"/>
-            <a:ext cx="1777015" cy="1330996"/>
-          </a:xfrm>
-          <a:prstGeom prst="curvedConnector3">
-            <a:avLst/>
-          </a:prstGeom>
-          <a:ln>
-            <a:tailEnd type="triangle"/>
-          </a:ln>
-        </p:spPr>
-        <p:style>
-          <a:lnRef idx="2">
-            <a:schemeClr val="accent2"/>
-          </a:lnRef>
-          <a:fillRef idx="0">
-            <a:schemeClr val="accent2"/>
-          </a:fillRef>
-          <a:effectRef idx="1">
-            <a:schemeClr val="accent2"/>
-          </a:effectRef>
-          <a:fontRef idx="minor">
-            <a:schemeClr val="tx1"/>
-          </a:fontRef>
-        </p:style>
-      </p:cxnSp>
-    </p:spTree>
-    <p:extLst>
-      <p:ext uri="{BB962C8B-B14F-4D97-AF65-F5344CB8AC3E}">
-        <p14:creationId xmlns:p14="http://schemas.microsoft.com/office/powerpoint/2010/main" val="573008012"/>
       </p:ext>
     </p:extLst>
   </p:cSld>

</xml_diff>